<commit_message>
fixes in if sparrow deck
</commit_message>
<xml_diff>
--- a/LearnWithLlew/src/main/org/learnwithllew/courseware/section03ifs/If Statements.pptx
+++ b/LearnWithLlew/src/main/org/learnwithllew/courseware/section03ifs/If Statements.pptx
@@ -5,7 +5,7 @@
     <p:sldMasterId id="2147483648" r:id="rId1"/>
   </p:sldMasterIdLst>
   <p:notesMasterIdLst>
-    <p:notesMasterId r:id="rId72"/>
+    <p:notesMasterId r:id="rId69"/>
   </p:notesMasterIdLst>
   <p:sldIdLst>
     <p:sldId id="308" r:id="rId2"/>
@@ -65,19 +65,16 @@
     <p:sldId id="379" r:id="rId56"/>
     <p:sldId id="361" r:id="rId57"/>
     <p:sldId id="378" r:id="rId58"/>
-    <p:sldId id="335" r:id="rId59"/>
-    <p:sldId id="377" r:id="rId60"/>
-    <p:sldId id="362" r:id="rId61"/>
-    <p:sldId id="376" r:id="rId62"/>
-    <p:sldId id="336" r:id="rId63"/>
-    <p:sldId id="375" r:id="rId64"/>
-    <p:sldId id="363" r:id="rId65"/>
-    <p:sldId id="374" r:id="rId66"/>
-    <p:sldId id="364" r:id="rId67"/>
-    <p:sldId id="373" r:id="rId68"/>
-    <p:sldId id="371" r:id="rId69"/>
-    <p:sldId id="372" r:id="rId70"/>
-    <p:sldId id="337" r:id="rId71"/>
+    <p:sldId id="362" r:id="rId59"/>
+    <p:sldId id="376" r:id="rId60"/>
+    <p:sldId id="336" r:id="rId61"/>
+    <p:sldId id="375" r:id="rId62"/>
+    <p:sldId id="363" r:id="rId63"/>
+    <p:sldId id="374" r:id="rId64"/>
+    <p:sldId id="364" r:id="rId65"/>
+    <p:sldId id="373" r:id="rId66"/>
+    <p:sldId id="371" r:id="rId67"/>
+    <p:sldId id="372" r:id="rId68"/>
   </p:sldIdLst>
   <p:sldSz cx="9144000" cy="6858000" type="screen4x3"/>
   <p:notesSz cx="6858000" cy="9144000"/>
@@ -277,7 +274,7 @@
           <a:p>
             <a:fld id="{BF231DB7-99AD-B54C-A263-814D8A66CD75}" type="datetimeFigureOut">
               <a:rPr lang="en-US" smtClean="0"/>
-              <a:t>8/23/20</a:t>
+              <a:t>8/25/20</a:t>
             </a:fld>
             <a:endParaRPr lang="en-US"/>
           </a:p>
@@ -2215,7 +2212,7 @@
     </p:spTree>
     <p:extLst>
       <p:ext uri="{BB962C8B-B14F-4D97-AF65-F5344CB8AC3E}">
-        <p14:creationId xmlns:p14="http://schemas.microsoft.com/office/powerpoint/2010/main" val="207603863"/>
+        <p14:creationId xmlns:p14="http://schemas.microsoft.com/office/powerpoint/2010/main" val="599043161"/>
       </p:ext>
     </p:extLst>
   </p:cSld>
@@ -2299,7 +2296,7 @@
     </p:spTree>
     <p:extLst>
       <p:ext uri="{BB962C8B-B14F-4D97-AF65-F5344CB8AC3E}">
-        <p14:creationId xmlns:p14="http://schemas.microsoft.com/office/powerpoint/2010/main" val="599043161"/>
+        <p14:creationId xmlns:p14="http://schemas.microsoft.com/office/powerpoint/2010/main" val="949683228"/>
       </p:ext>
     </p:extLst>
   </p:cSld>
@@ -2383,7 +2380,7 @@
     </p:spTree>
     <p:extLst>
       <p:ext uri="{BB962C8B-B14F-4D97-AF65-F5344CB8AC3E}">
-        <p14:creationId xmlns:p14="http://schemas.microsoft.com/office/powerpoint/2010/main" val="949683228"/>
+        <p14:creationId xmlns:p14="http://schemas.microsoft.com/office/powerpoint/2010/main" val="724672583"/>
       </p:ext>
     </p:extLst>
   </p:cSld>
@@ -2551,7 +2548,7 @@
     </p:spTree>
     <p:extLst>
       <p:ext uri="{BB962C8B-B14F-4D97-AF65-F5344CB8AC3E}">
-        <p14:creationId xmlns:p14="http://schemas.microsoft.com/office/powerpoint/2010/main" val="724672583"/>
+        <p14:creationId xmlns:p14="http://schemas.microsoft.com/office/powerpoint/2010/main" val="906631343"/>
       </p:ext>
     </p:extLst>
   </p:cSld>
@@ -2605,90 +2602,6 @@
           <a:bodyPr/>
           <a:lstStyle/>
           <a:p>
-            <a:endParaRPr lang="en-US" dirty="0"/>
-          </a:p>
-        </p:txBody>
-      </p:sp>
-      <p:sp>
-        <p:nvSpPr>
-          <p:cNvPr id="4" name="Slide Number Placeholder 3"/>
-          <p:cNvSpPr>
-            <a:spLocks noGrp="1"/>
-          </p:cNvSpPr>
-          <p:nvPr>
-            <p:ph type="sldNum" sz="quarter" idx="10"/>
-          </p:nvPr>
-        </p:nvSpPr>
-        <p:spPr/>
-        <p:txBody>
-          <a:bodyPr/>
-          <a:lstStyle/>
-          <a:p>
-            <a:fld id="{4B6A21CB-085A-4549-BD24-67BC800432B0}" type="slidenum">
-              <a:rPr lang="en-US" smtClean="0"/>
-              <a:t>66</a:t>
-            </a:fld>
-            <a:endParaRPr lang="en-US"/>
-          </a:p>
-        </p:txBody>
-      </p:sp>
-    </p:spTree>
-    <p:extLst>
-      <p:ext uri="{BB962C8B-B14F-4D97-AF65-F5344CB8AC3E}">
-        <p14:creationId xmlns:p14="http://schemas.microsoft.com/office/powerpoint/2010/main" val="906631343"/>
-      </p:ext>
-    </p:extLst>
-  </p:cSld>
-  <p:clrMapOvr>
-    <a:masterClrMapping/>
-  </p:clrMapOvr>
-</p:notes>
-</file>
-
-<file path=ppt/notesSlides/notesSlide32.xml><?xml version="1.0" encoding="utf-8"?>
-<p:notes xmlns:a="http://schemas.openxmlformats.org/drawingml/2006/main" xmlns:r="http://schemas.openxmlformats.org/officeDocument/2006/relationships" xmlns:p="http://schemas.openxmlformats.org/presentationml/2006/main">
-  <p:cSld>
-    <p:spTree>
-      <p:nvGrpSpPr>
-        <p:cNvPr id="1" name=""/>
-        <p:cNvGrpSpPr/>
-        <p:nvPr/>
-      </p:nvGrpSpPr>
-      <p:grpSpPr>
-        <a:xfrm>
-          <a:off x="0" y="0"/>
-          <a:ext cx="0" cy="0"/>
-          <a:chOff x="0" y="0"/>
-          <a:chExt cx="0" cy="0"/>
-        </a:xfrm>
-      </p:grpSpPr>
-      <p:sp>
-        <p:nvSpPr>
-          <p:cNvPr id="2" name="Slide Image Placeholder 1"/>
-          <p:cNvSpPr>
-            <a:spLocks noGrp="1" noRot="1" noChangeAspect="1"/>
-          </p:cNvSpPr>
-          <p:nvPr>
-            <p:ph type="sldImg"/>
-          </p:nvPr>
-        </p:nvSpPr>
-        <p:spPr/>
-      </p:sp>
-      <p:sp>
-        <p:nvSpPr>
-          <p:cNvPr id="3" name="Notes Placeholder 2"/>
-          <p:cNvSpPr>
-            <a:spLocks noGrp="1"/>
-          </p:cNvSpPr>
-          <p:nvPr>
-            <p:ph type="body" idx="1"/>
-          </p:nvPr>
-        </p:nvSpPr>
-        <p:spPr/>
-        <p:txBody>
-          <a:bodyPr/>
-          <a:lstStyle/>
-          <a:p>
             <a:endParaRPr lang="en-US"/>
           </a:p>
         </p:txBody>
@@ -2710,7 +2623,7 @@
           <a:p>
             <a:fld id="{4B6A21CB-085A-4549-BD24-67BC800432B0}" type="slidenum">
               <a:rPr lang="en-US" smtClean="0"/>
-              <a:t>68</a:t>
+              <a:t>66</a:t>
             </a:fld>
             <a:endParaRPr lang="en-US"/>
           </a:p>
@@ -2720,90 +2633,6 @@
     <p:extLst>
       <p:ext uri="{BB962C8B-B14F-4D97-AF65-F5344CB8AC3E}">
         <p14:creationId xmlns:p14="http://schemas.microsoft.com/office/powerpoint/2010/main" val="2568536591"/>
-      </p:ext>
-    </p:extLst>
-  </p:cSld>
-  <p:clrMapOvr>
-    <a:masterClrMapping/>
-  </p:clrMapOvr>
-</p:notes>
-</file>
-
-<file path=ppt/notesSlides/notesSlide33.xml><?xml version="1.0" encoding="utf-8"?>
-<p:notes xmlns:a="http://schemas.openxmlformats.org/drawingml/2006/main" xmlns:r="http://schemas.openxmlformats.org/officeDocument/2006/relationships" xmlns:p="http://schemas.openxmlformats.org/presentationml/2006/main">
-  <p:cSld>
-    <p:spTree>
-      <p:nvGrpSpPr>
-        <p:cNvPr id="1" name=""/>
-        <p:cNvGrpSpPr/>
-        <p:nvPr/>
-      </p:nvGrpSpPr>
-      <p:grpSpPr>
-        <a:xfrm>
-          <a:off x="0" y="0"/>
-          <a:ext cx="0" cy="0"/>
-          <a:chOff x="0" y="0"/>
-          <a:chExt cx="0" cy="0"/>
-        </a:xfrm>
-      </p:grpSpPr>
-      <p:sp>
-        <p:nvSpPr>
-          <p:cNvPr id="2" name="Slide Image Placeholder 1"/>
-          <p:cNvSpPr>
-            <a:spLocks noGrp="1" noRot="1" noChangeAspect="1"/>
-          </p:cNvSpPr>
-          <p:nvPr>
-            <p:ph type="sldImg"/>
-          </p:nvPr>
-        </p:nvSpPr>
-        <p:spPr/>
-      </p:sp>
-      <p:sp>
-        <p:nvSpPr>
-          <p:cNvPr id="3" name="Notes Placeholder 2"/>
-          <p:cNvSpPr>
-            <a:spLocks noGrp="1"/>
-          </p:cNvSpPr>
-          <p:nvPr>
-            <p:ph type="body" idx="1"/>
-          </p:nvPr>
-        </p:nvSpPr>
-        <p:spPr/>
-        <p:txBody>
-          <a:bodyPr/>
-          <a:lstStyle/>
-          <a:p>
-            <a:endParaRPr lang="en-US" dirty="0"/>
-          </a:p>
-        </p:txBody>
-      </p:sp>
-      <p:sp>
-        <p:nvSpPr>
-          <p:cNvPr id="4" name="Slide Number Placeholder 3"/>
-          <p:cNvSpPr>
-            <a:spLocks noGrp="1"/>
-          </p:cNvSpPr>
-          <p:nvPr>
-            <p:ph type="sldNum" sz="quarter" idx="10"/>
-          </p:nvPr>
-        </p:nvSpPr>
-        <p:spPr/>
-        <p:txBody>
-          <a:bodyPr/>
-          <a:lstStyle/>
-          <a:p>
-            <a:fld id="{4B6A21CB-085A-4549-BD24-67BC800432B0}" type="slidenum">
-              <a:rPr lang="en-US" smtClean="0"/>
-              <a:t>70</a:t>
-            </a:fld>
-            <a:endParaRPr lang="en-US"/>
-          </a:p>
-        </p:txBody>
-      </p:sp>
-    </p:spTree>
-    <p:extLst>
-      <p:ext uri="{BB962C8B-B14F-4D97-AF65-F5344CB8AC3E}">
-        <p14:creationId xmlns:p14="http://schemas.microsoft.com/office/powerpoint/2010/main" val="4007022476"/>
       </p:ext>
     </p:extLst>
   </p:cSld>
@@ -3496,7 +3325,7 @@
           <a:p>
             <a:fld id="{F37D3E6C-FAA7-4417-ACE7-35D2F9A430A8}" type="datetimeFigureOut">
               <a:rPr lang="en-US" smtClean="0"/>
-              <a:t>8/23/20</a:t>
+              <a:t>8/25/20</a:t>
             </a:fld>
             <a:endParaRPr lang="en-US"/>
           </a:p>
@@ -3659,7 +3488,7 @@
           <a:p>
             <a:fld id="{F37D3E6C-FAA7-4417-ACE7-35D2F9A430A8}" type="datetimeFigureOut">
               <a:rPr lang="en-US" smtClean="0"/>
-              <a:t>8/23/20</a:t>
+              <a:t>8/25/20</a:t>
             </a:fld>
             <a:endParaRPr lang="en-US"/>
           </a:p>
@@ -3832,7 +3661,7 @@
           <a:p>
             <a:fld id="{F37D3E6C-FAA7-4417-ACE7-35D2F9A430A8}" type="datetimeFigureOut">
               <a:rPr lang="en-US" smtClean="0"/>
-              <a:t>8/23/20</a:t>
+              <a:t>8/25/20</a:t>
             </a:fld>
             <a:endParaRPr lang="en-US"/>
           </a:p>
@@ -3995,7 +3824,7 @@
           <a:p>
             <a:fld id="{F37D3E6C-FAA7-4417-ACE7-35D2F9A430A8}" type="datetimeFigureOut">
               <a:rPr lang="en-US" smtClean="0"/>
-              <a:t>8/23/20</a:t>
+              <a:t>8/25/20</a:t>
             </a:fld>
             <a:endParaRPr lang="en-US"/>
           </a:p>
@@ -4235,7 +4064,7 @@
           <a:p>
             <a:fld id="{F37D3E6C-FAA7-4417-ACE7-35D2F9A430A8}" type="datetimeFigureOut">
               <a:rPr lang="en-US" smtClean="0"/>
-              <a:t>8/23/20</a:t>
+              <a:t>8/25/20</a:t>
             </a:fld>
             <a:endParaRPr lang="en-US"/>
           </a:p>
@@ -4515,7 +4344,7 @@
           <a:p>
             <a:fld id="{F37D3E6C-FAA7-4417-ACE7-35D2F9A430A8}" type="datetimeFigureOut">
               <a:rPr lang="en-US" smtClean="0"/>
-              <a:t>8/23/20</a:t>
+              <a:t>8/25/20</a:t>
             </a:fld>
             <a:endParaRPr lang="en-US"/>
           </a:p>
@@ -4929,7 +4758,7 @@
           <a:p>
             <a:fld id="{F37D3E6C-FAA7-4417-ACE7-35D2F9A430A8}" type="datetimeFigureOut">
               <a:rPr lang="en-US" smtClean="0"/>
-              <a:t>8/23/20</a:t>
+              <a:t>8/25/20</a:t>
             </a:fld>
             <a:endParaRPr lang="en-US"/>
           </a:p>
@@ -5041,7 +4870,7 @@
           <a:p>
             <a:fld id="{F37D3E6C-FAA7-4417-ACE7-35D2F9A430A8}" type="datetimeFigureOut">
               <a:rPr lang="en-US" smtClean="0"/>
-              <a:t>8/23/20</a:t>
+              <a:t>8/25/20</a:t>
             </a:fld>
             <a:endParaRPr lang="en-US"/>
           </a:p>
@@ -5131,7 +4960,7 @@
           <a:p>
             <a:fld id="{F37D3E6C-FAA7-4417-ACE7-35D2F9A430A8}" type="datetimeFigureOut">
               <a:rPr lang="en-US" smtClean="0"/>
-              <a:t>8/23/20</a:t>
+              <a:t>8/25/20</a:t>
             </a:fld>
             <a:endParaRPr lang="en-US"/>
           </a:p>
@@ -5401,7 +5230,7 @@
           <a:p>
             <a:fld id="{F37D3E6C-FAA7-4417-ACE7-35D2F9A430A8}" type="datetimeFigureOut">
               <a:rPr lang="en-US" smtClean="0"/>
-              <a:t>8/23/20</a:t>
+              <a:t>8/25/20</a:t>
             </a:fld>
             <a:endParaRPr lang="en-US"/>
           </a:p>
@@ -5648,7 +5477,7 @@
           <a:p>
             <a:fld id="{F37D3E6C-FAA7-4417-ACE7-35D2F9A430A8}" type="datetimeFigureOut">
               <a:rPr lang="en-US" smtClean="0"/>
-              <a:t>8/23/20</a:t>
+              <a:t>8/25/20</a:t>
             </a:fld>
             <a:endParaRPr lang="en-US"/>
           </a:p>
@@ -5854,7 +5683,7 @@
           <a:p>
             <a:fld id="{F37D3E6C-FAA7-4417-ACE7-35D2F9A430A8}" type="datetimeFigureOut">
               <a:rPr lang="en-US" smtClean="0"/>
-              <a:t>8/23/20</a:t>
+              <a:t>8/25/20</a:t>
             </a:fld>
             <a:endParaRPr lang="en-US"/>
           </a:p>
@@ -27908,10 +27737,10 @@
       </p:sp>
       <p:sp>
         <p:nvSpPr>
-          <p:cNvPr id="2" name="Rectangle 1">
+          <p:cNvPr id="4" name="Rectangle 3">
             <a:extLst>
               <a:ext uri="{FF2B5EF4-FFF2-40B4-BE49-F238E27FC236}">
-                <a16:creationId xmlns:a16="http://schemas.microsoft.com/office/drawing/2014/main" id="{4FD6FC00-FF3A-D54F-9E80-71ADFA594ED1}"/>
+                <a16:creationId xmlns:a16="http://schemas.microsoft.com/office/drawing/2014/main" id="{1B08CDDF-54B5-F443-9D17-59D98747208D}"/>
               </a:ext>
             </a:extLst>
           </p:cNvPr>
@@ -27920,8 +27749,8 @@
         </p:nvSpPr>
         <p:spPr>
           <a:xfrm>
-            <a:off x="3587553" y="3810000"/>
-            <a:ext cx="1418978" cy="1323439"/>
+            <a:off x="2661819" y="3788977"/>
+            <a:ext cx="3270446" cy="1323439"/>
           </a:xfrm>
           <a:prstGeom prst="rect">
             <a:avLst/>
@@ -27937,15 +27766,15 @@
             <a:r>
               <a:rPr lang="en-US" sz="8000" b="1" dirty="0">
                 <a:solidFill>
-                  <a:srgbClr val="FF2600"/>
-                </a:solidFill>
-                <a:latin typeface="Menlo" panose="020B0609030804020204" pitchFamily="49" charset="0"/>
-              </a:rPr>
-              <a:t>If</a:t>
+                  <a:srgbClr val="00B050"/>
+                </a:solidFill>
+                <a:latin typeface="Menlo" panose="020B0609030804020204" pitchFamily="49" charset="0"/>
+              </a:rPr>
+              <a:t>Else </a:t>
             </a:r>
             <a:endParaRPr lang="en-US" b="1" dirty="0">
               <a:solidFill>
-                <a:srgbClr val="FF2600"/>
+                <a:srgbClr val="00B050"/>
               </a:solidFill>
             </a:endParaRPr>
           </a:p>
@@ -28047,6 +27876,44 @@
                 </a:solidFill>
                 <a:latin typeface="Menlo" panose="020B0609030804020204" pitchFamily="49" charset="0"/>
               </a:rPr>
+              <a:t>8</a:t>
+            </a:r>
+            <a:r>
+              <a:rPr lang="en-US" sz="2400" dirty="0">
+                <a:solidFill>
+                  <a:srgbClr val="000000"/>
+                </a:solidFill>
+                <a:latin typeface="Menlo" panose="020B0609030804020204" pitchFamily="49" charset="0"/>
+              </a:rPr>
+              <a:t> ;</a:t>
+            </a:r>
+          </a:p>
+          <a:p>
+            <a:r>
+              <a:rPr lang="en-US" sz="2400" dirty="0">
+                <a:solidFill>
+                  <a:srgbClr val="AF00DB"/>
+                </a:solidFill>
+                <a:latin typeface="Menlo" panose="020B0609030804020204" pitchFamily="49" charset="0"/>
+              </a:rPr>
+              <a:t>if</a:t>
+            </a:r>
+            <a:r>
+              <a:rPr lang="en-US" sz="2400" dirty="0">
+                <a:solidFill>
+                  <a:srgbClr val="000000"/>
+                </a:solidFill>
+                <a:latin typeface="Menlo" panose="020B0609030804020204" pitchFamily="49" charset="0"/>
+              </a:rPr>
+              <a:t> (player1 == </a:t>
+            </a:r>
+            <a:r>
+              <a:rPr lang="en-US" sz="2400" dirty="0">
+                <a:solidFill>
+                  <a:srgbClr val="098658"/>
+                </a:solidFill>
+                <a:latin typeface="Menlo" panose="020B0609030804020204" pitchFamily="49" charset="0"/>
+              </a:rPr>
               <a:t>3</a:t>
             </a:r>
             <a:r>
@@ -28056,7 +27923,56 @@
                 </a:solidFill>
                 <a:latin typeface="Menlo" panose="020B0609030804020204" pitchFamily="49" charset="0"/>
               </a:rPr>
-              <a:t>;</a:t>
+              <a:t>){</a:t>
+            </a:r>
+          </a:p>
+          <a:p>
+            <a:r>
+              <a:rPr lang="en-US" sz="2400" dirty="0">
+                <a:solidFill>
+                  <a:srgbClr val="795E26"/>
+                </a:solidFill>
+                <a:latin typeface="Menlo" panose="020B0609030804020204" pitchFamily="49" charset="0"/>
+              </a:rPr>
+              <a:t>say</a:t>
+            </a:r>
+            <a:r>
+              <a:rPr lang="en-US" sz="2400" dirty="0">
+                <a:solidFill>
+                  <a:srgbClr val="000000"/>
+                </a:solidFill>
+                <a:latin typeface="Menlo" panose="020B0609030804020204" pitchFamily="49" charset="0"/>
+              </a:rPr>
+              <a:t>(</a:t>
+            </a:r>
+            <a:r>
+              <a:rPr lang="en-US" sz="2400" dirty="0">
+                <a:solidFill>
+                  <a:srgbClr val="A31515"/>
+                </a:solidFill>
+                <a:latin typeface="Menlo" panose="020B0609030804020204" pitchFamily="49" charset="0"/>
+              </a:rPr>
+              <a:t>"If"</a:t>
+            </a:r>
+            <a:r>
+              <a:rPr lang="en-US" sz="2400" dirty="0">
+                <a:solidFill>
+                  <a:srgbClr val="000000"/>
+                </a:solidFill>
+                <a:latin typeface="Menlo" panose="020B0609030804020204" pitchFamily="49" charset="0"/>
+              </a:rPr>
+              <a:t>);</a:t>
+            </a:r>
+          </a:p>
+          <a:p>
+            <a:r>
+              <a:rPr lang="en-US" sz="2400" dirty="0">
+                <a:solidFill>
+                  <a:srgbClr val="000000"/>
+                </a:solidFill>
+                <a:latin typeface="Menlo" panose="020B0609030804020204" pitchFamily="49" charset="0"/>
+              </a:rPr>
+              <a:t>}</a:t>
             </a:r>
           </a:p>
           <a:p>
@@ -28067,6 +27983,24 @@
                 </a:solidFill>
                 <a:latin typeface="Menlo" panose="020B0609030804020204" pitchFamily="49" charset="0"/>
               </a:rPr>
+              <a:t>else</a:t>
+            </a:r>
+            <a:r>
+              <a:rPr lang="en-US" sz="2400" dirty="0">
+                <a:solidFill>
+                  <a:srgbClr val="000000"/>
+                </a:solidFill>
+                <a:latin typeface="Menlo" panose="020B0609030804020204" pitchFamily="49" charset="0"/>
+              </a:rPr>
+              <a:t> </a:t>
+            </a:r>
+            <a:r>
+              <a:rPr lang="en-US" sz="2400" dirty="0">
+                <a:solidFill>
+                  <a:srgbClr val="AF00DB"/>
+                </a:solidFill>
+                <a:latin typeface="Menlo" panose="020B0609030804020204" pitchFamily="49" charset="0"/>
+              </a:rPr>
               <a:t>if</a:t>
             </a:r>
             <a:r>
@@ -28076,7 +28010,7 @@
                 </a:solidFill>
                 <a:latin typeface="Menlo" panose="020B0609030804020204" pitchFamily="49" charset="0"/>
               </a:rPr>
-              <a:t> (player1 == </a:t>
+              <a:t> (player1 &lt;= </a:t>
             </a:r>
             <a:r>
               <a:rPr lang="en-US" sz="2400" dirty="0">
@@ -28085,7 +28019,7 @@
                 </a:solidFill>
                 <a:latin typeface="Menlo" panose="020B0609030804020204" pitchFamily="49" charset="0"/>
               </a:rPr>
-              <a:t>3</a:t>
+              <a:t>8</a:t>
             </a:r>
             <a:r>
               <a:rPr lang="en-US" sz="2400" dirty="0">
@@ -28105,16 +28039,25 @@
                 </a:solidFill>
                 <a:latin typeface="Menlo" panose="020B0609030804020204" pitchFamily="49" charset="0"/>
               </a:rPr>
-              <a:t>say("</a:t>
-            </a:r>
-            <a:r>
-              <a:rPr lang="en-US" sz="2400" dirty="0">
-                <a:solidFill>
-                  <a:srgbClr val="A31515"/>
-                </a:solidFill>
-                <a:latin typeface="Menlo" panose="020B0609030804020204" pitchFamily="49" charset="0"/>
-              </a:rPr>
-              <a:t>If"</a:t>
+              <a:t>say</a:t>
+            </a:r>
+            <a:r>
+              <a:rPr lang="en-US" sz="2400" dirty="0">
+                <a:solidFill>
+                  <a:srgbClr val="000000"/>
+                </a:solidFill>
+                <a:latin typeface="Menlo" panose="020B0609030804020204" pitchFamily="49" charset="0"/>
+              </a:rPr>
+              <a:t>(</a:t>
+            </a:r>
+            <a:r>
+              <a:rPr lang="en-US" sz="2400" dirty="0">
+                <a:solidFill>
+                  <a:srgbClr val="A31515"/>
+                </a:solidFill>
+                <a:latin typeface="Menlo" panose="020B0609030804020204" pitchFamily="49" charset="0"/>
+              </a:rPr>
+              <a:t>"Else If"</a:t>
             </a:r>
             <a:r>
               <a:rPr lang="en-US" sz="2400" dirty="0">
@@ -28154,208 +28097,76 @@
                 </a:solidFill>
                 <a:latin typeface="Menlo" panose="020B0609030804020204" pitchFamily="49" charset="0"/>
               </a:rPr>
+              <a:t>{</a:t>
+            </a:r>
+          </a:p>
+          <a:p>
+            <a:r>
+              <a:rPr lang="en-US" sz="2400" dirty="0">
+                <a:solidFill>
+                  <a:srgbClr val="795E26"/>
+                </a:solidFill>
+                <a:latin typeface="Menlo" panose="020B0609030804020204" pitchFamily="49" charset="0"/>
+              </a:rPr>
+              <a:t>say</a:t>
+            </a:r>
+            <a:r>
+              <a:rPr lang="en-US" sz="2400" dirty="0">
+                <a:solidFill>
+                  <a:srgbClr val="000000"/>
+                </a:solidFill>
+                <a:latin typeface="Menlo" panose="020B0609030804020204" pitchFamily="49" charset="0"/>
+              </a:rPr>
+              <a:t>(</a:t>
+            </a:r>
+            <a:r>
+              <a:rPr lang="en-US" sz="2400" dirty="0">
+                <a:solidFill>
+                  <a:srgbClr val="A31515"/>
+                </a:solidFill>
+                <a:latin typeface="Menlo" panose="020B0609030804020204" pitchFamily="49" charset="0"/>
+              </a:rPr>
+              <a:t>"Else"</a:t>
+            </a:r>
+            <a:r>
+              <a:rPr lang="en-US" sz="2400" dirty="0">
+                <a:solidFill>
+                  <a:srgbClr val="000000"/>
+                </a:solidFill>
+                <a:latin typeface="Menlo" panose="020B0609030804020204" pitchFamily="49" charset="0"/>
+              </a:rPr>
+              <a:t>);</a:t>
+            </a:r>
+          </a:p>
+          <a:p>
+            <a:r>
+              <a:rPr lang="en-US" sz="2400" dirty="0">
+                <a:solidFill>
+                  <a:srgbClr val="000000"/>
+                </a:solidFill>
+                <a:latin typeface="Menlo" panose="020B0609030804020204" pitchFamily="49" charset="0"/>
+              </a:rPr>
+              <a:t>}</a:t>
+            </a:r>
+          </a:p>
+          <a:p>
+            <a:r>
+              <a:rPr lang="da-DK" sz="2400" dirty="0">
+                <a:solidFill>
+                  <a:srgbClr val="000000"/>
+                </a:solidFill>
+                <a:latin typeface="Monaco"/>
+              </a:rPr>
               <a:t> </a:t>
             </a:r>
-            <a:r>
-              <a:rPr lang="en-US" sz="2400" dirty="0">
-                <a:solidFill>
-                  <a:srgbClr val="AF00DB"/>
-                </a:solidFill>
-                <a:latin typeface="Menlo" panose="020B0609030804020204" pitchFamily="49" charset="0"/>
-              </a:rPr>
-              <a:t>if</a:t>
-            </a:r>
-            <a:r>
-              <a:rPr lang="en-US" sz="2400" dirty="0">
-                <a:solidFill>
-                  <a:srgbClr val="000000"/>
-                </a:solidFill>
-                <a:latin typeface="Menlo" panose="020B0609030804020204" pitchFamily="49" charset="0"/>
-              </a:rPr>
-              <a:t> (player1 == </a:t>
-            </a:r>
-            <a:r>
-              <a:rPr lang="en-US" sz="2400" dirty="0">
-                <a:solidFill>
-                  <a:srgbClr val="098658"/>
-                </a:solidFill>
-                <a:latin typeface="Menlo" panose="020B0609030804020204" pitchFamily="49" charset="0"/>
-              </a:rPr>
-              <a:t>5</a:t>
-            </a:r>
-            <a:r>
-              <a:rPr lang="en-US" sz="2400" dirty="0">
-                <a:solidFill>
-                  <a:srgbClr val="000000"/>
-                </a:solidFill>
-                <a:latin typeface="Menlo" panose="020B0609030804020204" pitchFamily="49" charset="0"/>
-              </a:rPr>
-              <a:t>){</a:t>
-            </a:r>
-          </a:p>
-          <a:p>
-            <a:r>
-              <a:rPr lang="en-US" sz="2400" dirty="0">
-                <a:solidFill>
-                  <a:srgbClr val="795E26"/>
-                </a:solidFill>
-                <a:latin typeface="Menlo" panose="020B0609030804020204" pitchFamily="49" charset="0"/>
-              </a:rPr>
-              <a:t>say("</a:t>
-            </a:r>
-            <a:r>
-              <a:rPr lang="en-US" sz="2400" dirty="0">
-                <a:solidFill>
-                  <a:srgbClr val="A31515"/>
-                </a:solidFill>
-                <a:latin typeface="Menlo" panose="020B0609030804020204" pitchFamily="49" charset="0"/>
-              </a:rPr>
-              <a:t>Else If"</a:t>
-            </a:r>
-            <a:r>
-              <a:rPr lang="en-US" sz="2400" dirty="0">
-                <a:solidFill>
-                  <a:srgbClr val="000000"/>
-                </a:solidFill>
-                <a:latin typeface="Menlo" panose="020B0609030804020204" pitchFamily="49" charset="0"/>
-              </a:rPr>
-              <a:t>);</a:t>
-            </a:r>
-          </a:p>
-          <a:p>
-            <a:r>
-              <a:rPr lang="en-US" sz="2400" dirty="0">
-                <a:solidFill>
-                  <a:srgbClr val="000000"/>
-                </a:solidFill>
-                <a:latin typeface="Menlo" panose="020B0609030804020204" pitchFamily="49" charset="0"/>
-              </a:rPr>
-              <a:t>}</a:t>
-            </a:r>
-          </a:p>
-          <a:p>
-            <a:r>
-              <a:rPr lang="en-US" sz="2400" dirty="0">
-                <a:solidFill>
-                  <a:srgbClr val="AF00DB"/>
-                </a:solidFill>
-                <a:latin typeface="Menlo" panose="020B0609030804020204" pitchFamily="49" charset="0"/>
-              </a:rPr>
-              <a:t>else</a:t>
-            </a:r>
-            <a:r>
-              <a:rPr lang="en-US" sz="2400" dirty="0">
-                <a:solidFill>
-                  <a:srgbClr val="000000"/>
-                </a:solidFill>
-                <a:latin typeface="Menlo" panose="020B0609030804020204" pitchFamily="49" charset="0"/>
-              </a:rPr>
-              <a:t>{</a:t>
-            </a:r>
-          </a:p>
-          <a:p>
-            <a:r>
-              <a:rPr lang="en-US" sz="2400" dirty="0">
-                <a:solidFill>
-                  <a:srgbClr val="795E26"/>
-                </a:solidFill>
-                <a:latin typeface="Menlo" panose="020B0609030804020204" pitchFamily="49" charset="0"/>
-              </a:rPr>
-              <a:t>say("</a:t>
-            </a:r>
-            <a:r>
-              <a:rPr lang="en-US" sz="2400" dirty="0">
-                <a:solidFill>
-                  <a:srgbClr val="A31515"/>
-                </a:solidFill>
-                <a:latin typeface="Menlo" panose="020B0609030804020204" pitchFamily="49" charset="0"/>
-              </a:rPr>
-              <a:t>Else "</a:t>
-            </a:r>
-            <a:r>
-              <a:rPr lang="en-US" sz="2400" dirty="0">
-                <a:solidFill>
-                  <a:srgbClr val="000000"/>
-                </a:solidFill>
-                <a:latin typeface="Menlo" panose="020B0609030804020204" pitchFamily="49" charset="0"/>
-              </a:rPr>
-              <a:t>);</a:t>
-            </a:r>
-          </a:p>
-          <a:p>
-            <a:r>
-              <a:rPr lang="en-US" sz="2400" dirty="0">
-                <a:solidFill>
-                  <a:srgbClr val="000000"/>
-                </a:solidFill>
-                <a:latin typeface="Menlo" panose="020B0609030804020204" pitchFamily="49" charset="0"/>
-              </a:rPr>
-              <a:t>}</a:t>
-            </a:r>
-          </a:p>
-          <a:p>
-            <a:r>
-              <a:rPr lang="da-DK" sz="2400" dirty="0">
-                <a:solidFill>
-                  <a:srgbClr val="000000"/>
-                </a:solidFill>
-                <a:latin typeface="Monaco"/>
-              </a:rPr>
-              <a:t> </a:t>
-            </a:r>
             <a:endParaRPr lang="en-US" sz="2400" dirty="0"/>
-          </a:p>
-        </p:txBody>
-      </p:sp>
-      <p:sp>
-        <p:nvSpPr>
-          <p:cNvPr id="4" name="Rectangle 3">
-            <a:extLst>
-              <a:ext uri="{FF2B5EF4-FFF2-40B4-BE49-F238E27FC236}">
-                <a16:creationId xmlns:a16="http://schemas.microsoft.com/office/drawing/2014/main" id="{C3864E34-FDD4-C944-988F-EA845CFA951E}"/>
-              </a:ext>
-            </a:extLst>
-          </p:cNvPr>
-          <p:cNvSpPr/>
-          <p:nvPr/>
-        </p:nvSpPr>
-        <p:spPr>
-          <a:xfrm>
-            <a:off x="2044663" y="3809999"/>
-            <a:ext cx="4504759" cy="1323439"/>
-          </a:xfrm>
-          <a:prstGeom prst="rect">
-            <a:avLst/>
-          </a:prstGeom>
-        </p:spPr>
-        <p:txBody>
-          <a:bodyPr wrap="none">
-            <a:spAutoFit/>
-          </a:bodyPr>
-          <a:lstStyle/>
-          <a:p>
-            <a:pPr algn="ctr"/>
-            <a:r>
-              <a:rPr lang="en-US" sz="8000" b="1" dirty="0">
-                <a:solidFill>
-                  <a:srgbClr val="0070C0"/>
-                </a:solidFill>
-                <a:latin typeface="Menlo" panose="020B0609030804020204" pitchFamily="49" charset="0"/>
-              </a:rPr>
-              <a:t>Else If</a:t>
-            </a:r>
-            <a:endParaRPr lang="en-US" b="1" dirty="0">
-              <a:solidFill>
-                <a:srgbClr val="0070C0"/>
-              </a:solidFill>
-            </a:endParaRPr>
           </a:p>
         </p:txBody>
       </p:sp>
     </p:spTree>
     <p:extLst>
       <p:ext uri="{BB962C8B-B14F-4D97-AF65-F5344CB8AC3E}">
-        <p14:creationId xmlns:p14="http://schemas.microsoft.com/office/powerpoint/2010/main" val="3001672797"/>
+        <p14:creationId xmlns:p14="http://schemas.microsoft.com/office/powerpoint/2010/main" val="850790500"/>
       </p:ext>
     </p:extLst>
   </p:cSld>
@@ -28385,376 +28196,6 @@
       </p:grpSpPr>
       <p:sp>
         <p:nvSpPr>
-          <p:cNvPr id="5" name="TextBox 4"/>
-          <p:cNvSpPr txBox="1"/>
-          <p:nvPr/>
-        </p:nvSpPr>
-        <p:spPr>
-          <a:xfrm>
-            <a:off x="190500" y="228600"/>
-            <a:ext cx="8763000" cy="4154984"/>
-          </a:xfrm>
-          <a:prstGeom prst="rect">
-            <a:avLst/>
-          </a:prstGeom>
-          <a:noFill/>
-        </p:spPr>
-        <p:txBody>
-          <a:bodyPr wrap="square" rtlCol="0">
-            <a:spAutoFit/>
-          </a:bodyPr>
-          <a:lstStyle/>
-          <a:p>
-            <a:r>
-              <a:rPr lang="en-US" sz="2400" dirty="0">
-                <a:solidFill>
-                  <a:srgbClr val="267F99"/>
-                </a:solidFill>
-                <a:latin typeface="Menlo" panose="020B0609030804020204" pitchFamily="49" charset="0"/>
-              </a:rPr>
-              <a:t>int</a:t>
-            </a:r>
-            <a:r>
-              <a:rPr lang="en-US" sz="2400" dirty="0">
-                <a:solidFill>
-                  <a:srgbClr val="000000"/>
-                </a:solidFill>
-                <a:latin typeface="Menlo" panose="020B0609030804020204" pitchFamily="49" charset="0"/>
-              </a:rPr>
-              <a:t> </a:t>
-            </a:r>
-            <a:r>
-              <a:rPr lang="en-US" sz="2400" dirty="0">
-                <a:solidFill>
-                  <a:srgbClr val="001080"/>
-                </a:solidFill>
-                <a:latin typeface="Menlo" panose="020B0609030804020204" pitchFamily="49" charset="0"/>
-              </a:rPr>
-              <a:t>player1</a:t>
-            </a:r>
-            <a:r>
-              <a:rPr lang="en-US" sz="2400" dirty="0">
-                <a:solidFill>
-                  <a:srgbClr val="000000"/>
-                </a:solidFill>
-                <a:latin typeface="Menlo" panose="020B0609030804020204" pitchFamily="49" charset="0"/>
-              </a:rPr>
-              <a:t> = </a:t>
-            </a:r>
-            <a:r>
-              <a:rPr lang="en-US" sz="2400" dirty="0">
-                <a:solidFill>
-                  <a:srgbClr val="098658"/>
-                </a:solidFill>
-                <a:latin typeface="Menlo" panose="020B0609030804020204" pitchFamily="49" charset="0"/>
-              </a:rPr>
-              <a:t>3</a:t>
-            </a:r>
-            <a:r>
-              <a:rPr lang="en-US" sz="2400" dirty="0">
-                <a:solidFill>
-                  <a:srgbClr val="000000"/>
-                </a:solidFill>
-                <a:latin typeface="Menlo" panose="020B0609030804020204" pitchFamily="49" charset="0"/>
-              </a:rPr>
-              <a:t>;</a:t>
-            </a:r>
-          </a:p>
-          <a:p>
-            <a:r>
-              <a:rPr lang="en-US" sz="2400" dirty="0">
-                <a:solidFill>
-                  <a:srgbClr val="AF00DB"/>
-                </a:solidFill>
-                <a:latin typeface="Menlo" panose="020B0609030804020204" pitchFamily="49" charset="0"/>
-              </a:rPr>
-              <a:t>if</a:t>
-            </a:r>
-            <a:r>
-              <a:rPr lang="en-US" sz="2400" dirty="0">
-                <a:solidFill>
-                  <a:srgbClr val="000000"/>
-                </a:solidFill>
-                <a:latin typeface="Menlo" panose="020B0609030804020204" pitchFamily="49" charset="0"/>
-              </a:rPr>
-              <a:t> (player1 == </a:t>
-            </a:r>
-            <a:r>
-              <a:rPr lang="en-US" sz="2400" dirty="0">
-                <a:solidFill>
-                  <a:srgbClr val="098658"/>
-                </a:solidFill>
-                <a:latin typeface="Menlo" panose="020B0609030804020204" pitchFamily="49" charset="0"/>
-              </a:rPr>
-              <a:t>3</a:t>
-            </a:r>
-            <a:r>
-              <a:rPr lang="en-US" sz="2400" dirty="0">
-                <a:solidFill>
-                  <a:srgbClr val="000000"/>
-                </a:solidFill>
-                <a:latin typeface="Menlo" panose="020B0609030804020204" pitchFamily="49" charset="0"/>
-              </a:rPr>
-              <a:t>){</a:t>
-            </a:r>
-          </a:p>
-          <a:p>
-            <a:r>
-              <a:rPr lang="en-US" sz="2400" dirty="0">
-                <a:solidFill>
-                  <a:srgbClr val="795E26"/>
-                </a:solidFill>
-                <a:latin typeface="Menlo" panose="020B0609030804020204" pitchFamily="49" charset="0"/>
-              </a:rPr>
-              <a:t>say("</a:t>
-            </a:r>
-            <a:r>
-              <a:rPr lang="en-US" sz="2400" dirty="0">
-                <a:solidFill>
-                  <a:srgbClr val="A31515"/>
-                </a:solidFill>
-                <a:latin typeface="Menlo" panose="020B0609030804020204" pitchFamily="49" charset="0"/>
-              </a:rPr>
-              <a:t>If"</a:t>
-            </a:r>
-            <a:r>
-              <a:rPr lang="en-US" sz="2400" dirty="0">
-                <a:solidFill>
-                  <a:srgbClr val="000000"/>
-                </a:solidFill>
-                <a:latin typeface="Menlo" panose="020B0609030804020204" pitchFamily="49" charset="0"/>
-              </a:rPr>
-              <a:t>);</a:t>
-            </a:r>
-          </a:p>
-          <a:p>
-            <a:r>
-              <a:rPr lang="en-US" sz="2400" dirty="0">
-                <a:solidFill>
-                  <a:srgbClr val="000000"/>
-                </a:solidFill>
-                <a:latin typeface="Menlo" panose="020B0609030804020204" pitchFamily="49" charset="0"/>
-              </a:rPr>
-              <a:t>}</a:t>
-            </a:r>
-          </a:p>
-          <a:p>
-            <a:r>
-              <a:rPr lang="en-US" sz="2400" dirty="0">
-                <a:solidFill>
-                  <a:srgbClr val="AF00DB"/>
-                </a:solidFill>
-                <a:latin typeface="Menlo" panose="020B0609030804020204" pitchFamily="49" charset="0"/>
-              </a:rPr>
-              <a:t>else</a:t>
-            </a:r>
-            <a:r>
-              <a:rPr lang="en-US" sz="2400" dirty="0">
-                <a:solidFill>
-                  <a:srgbClr val="000000"/>
-                </a:solidFill>
-                <a:latin typeface="Menlo" panose="020B0609030804020204" pitchFamily="49" charset="0"/>
-              </a:rPr>
-              <a:t> </a:t>
-            </a:r>
-            <a:r>
-              <a:rPr lang="en-US" sz="2400" dirty="0">
-                <a:solidFill>
-                  <a:srgbClr val="AF00DB"/>
-                </a:solidFill>
-                <a:latin typeface="Menlo" panose="020B0609030804020204" pitchFamily="49" charset="0"/>
-              </a:rPr>
-              <a:t>if</a:t>
-            </a:r>
-            <a:r>
-              <a:rPr lang="en-US" sz="2400" dirty="0">
-                <a:solidFill>
-                  <a:srgbClr val="000000"/>
-                </a:solidFill>
-                <a:latin typeface="Menlo" panose="020B0609030804020204" pitchFamily="49" charset="0"/>
-              </a:rPr>
-              <a:t> (player1 == </a:t>
-            </a:r>
-            <a:r>
-              <a:rPr lang="en-US" sz="2400" dirty="0">
-                <a:solidFill>
-                  <a:srgbClr val="098658"/>
-                </a:solidFill>
-                <a:latin typeface="Menlo" panose="020B0609030804020204" pitchFamily="49" charset="0"/>
-              </a:rPr>
-              <a:t>5</a:t>
-            </a:r>
-            <a:r>
-              <a:rPr lang="en-US" sz="2400" dirty="0">
-                <a:solidFill>
-                  <a:srgbClr val="000000"/>
-                </a:solidFill>
-                <a:latin typeface="Menlo" panose="020B0609030804020204" pitchFamily="49" charset="0"/>
-              </a:rPr>
-              <a:t>){</a:t>
-            </a:r>
-          </a:p>
-          <a:p>
-            <a:r>
-              <a:rPr lang="en-US" sz="2400" dirty="0">
-                <a:solidFill>
-                  <a:srgbClr val="795E26"/>
-                </a:solidFill>
-                <a:latin typeface="Menlo" panose="020B0609030804020204" pitchFamily="49" charset="0"/>
-              </a:rPr>
-              <a:t>say("</a:t>
-            </a:r>
-            <a:r>
-              <a:rPr lang="en-US" sz="2400" dirty="0">
-                <a:solidFill>
-                  <a:srgbClr val="A31515"/>
-                </a:solidFill>
-                <a:latin typeface="Menlo" panose="020B0609030804020204" pitchFamily="49" charset="0"/>
-              </a:rPr>
-              <a:t>Else If"</a:t>
-            </a:r>
-            <a:r>
-              <a:rPr lang="en-US" sz="2400" dirty="0">
-                <a:solidFill>
-                  <a:srgbClr val="000000"/>
-                </a:solidFill>
-                <a:latin typeface="Menlo" panose="020B0609030804020204" pitchFamily="49" charset="0"/>
-              </a:rPr>
-              <a:t>);</a:t>
-            </a:r>
-          </a:p>
-          <a:p>
-            <a:r>
-              <a:rPr lang="en-US" sz="2400" dirty="0">
-                <a:solidFill>
-                  <a:srgbClr val="000000"/>
-                </a:solidFill>
-                <a:latin typeface="Menlo" panose="020B0609030804020204" pitchFamily="49" charset="0"/>
-              </a:rPr>
-              <a:t>}</a:t>
-            </a:r>
-          </a:p>
-          <a:p>
-            <a:r>
-              <a:rPr lang="en-US" sz="2400" dirty="0">
-                <a:solidFill>
-                  <a:srgbClr val="AF00DB"/>
-                </a:solidFill>
-                <a:latin typeface="Menlo" panose="020B0609030804020204" pitchFamily="49" charset="0"/>
-              </a:rPr>
-              <a:t>else</a:t>
-            </a:r>
-            <a:r>
-              <a:rPr lang="en-US" sz="2400" dirty="0">
-                <a:solidFill>
-                  <a:srgbClr val="000000"/>
-                </a:solidFill>
-                <a:latin typeface="Menlo" panose="020B0609030804020204" pitchFamily="49" charset="0"/>
-              </a:rPr>
-              <a:t>{</a:t>
-            </a:r>
-          </a:p>
-          <a:p>
-            <a:r>
-              <a:rPr lang="en-US" sz="2400" dirty="0">
-                <a:solidFill>
-                  <a:srgbClr val="795E26"/>
-                </a:solidFill>
-                <a:latin typeface="Menlo" panose="020B0609030804020204" pitchFamily="49" charset="0"/>
-              </a:rPr>
-              <a:t>say("</a:t>
-            </a:r>
-            <a:r>
-              <a:rPr lang="en-US" sz="2400" dirty="0">
-                <a:solidFill>
-                  <a:srgbClr val="A31515"/>
-                </a:solidFill>
-                <a:latin typeface="Menlo" panose="020B0609030804020204" pitchFamily="49" charset="0"/>
-              </a:rPr>
-              <a:t>Else "</a:t>
-            </a:r>
-            <a:r>
-              <a:rPr lang="en-US" sz="2400" dirty="0">
-                <a:solidFill>
-                  <a:srgbClr val="000000"/>
-                </a:solidFill>
-                <a:latin typeface="Menlo" panose="020B0609030804020204" pitchFamily="49" charset="0"/>
-              </a:rPr>
-              <a:t>);</a:t>
-            </a:r>
-          </a:p>
-          <a:p>
-            <a:r>
-              <a:rPr lang="en-US" sz="2400" dirty="0">
-                <a:solidFill>
-                  <a:srgbClr val="000000"/>
-                </a:solidFill>
-                <a:latin typeface="Menlo" panose="020B0609030804020204" pitchFamily="49" charset="0"/>
-              </a:rPr>
-              <a:t>}</a:t>
-            </a:r>
-          </a:p>
-          <a:p>
-            <a:r>
-              <a:rPr lang="da-DK" sz="2400" dirty="0">
-                <a:solidFill>
-                  <a:srgbClr val="000000"/>
-                </a:solidFill>
-                <a:latin typeface="Monaco"/>
-              </a:rPr>
-              <a:t> </a:t>
-            </a:r>
-            <a:endParaRPr lang="en-US" sz="2400" dirty="0"/>
-          </a:p>
-        </p:txBody>
-      </p:sp>
-      <p:sp>
-        <p:nvSpPr>
-          <p:cNvPr id="2" name="Rectangle 1">
-            <a:extLst>
-              <a:ext uri="{FF2B5EF4-FFF2-40B4-BE49-F238E27FC236}">
-                <a16:creationId xmlns:a16="http://schemas.microsoft.com/office/drawing/2014/main" id="{4FD6FC00-FF3A-D54F-9E80-71ADFA594ED1}"/>
-              </a:ext>
-            </a:extLst>
-          </p:cNvPr>
-          <p:cNvSpPr/>
-          <p:nvPr/>
-        </p:nvSpPr>
-        <p:spPr>
-          <a:xfrm>
-            <a:off x="3587553" y="3810000"/>
-            <a:ext cx="1418978" cy="1323439"/>
-          </a:xfrm>
-          <a:prstGeom prst="rect">
-            <a:avLst/>
-          </a:prstGeom>
-        </p:spPr>
-        <p:txBody>
-          <a:bodyPr wrap="none">
-            <a:spAutoFit/>
-          </a:bodyPr>
-          <a:lstStyle/>
-          <a:p>
-            <a:pPr algn="ctr"/>
-            <a:r>
-              <a:rPr lang="en-US" sz="8000" b="1" dirty="0">
-                <a:solidFill>
-                  <a:srgbClr val="FF2600"/>
-                </a:solidFill>
-                <a:latin typeface="Menlo" panose="020B0609030804020204" pitchFamily="49" charset="0"/>
-              </a:rPr>
-              <a:t>If</a:t>
-            </a:r>
-            <a:endParaRPr lang="en-US" b="1" dirty="0">
-              <a:solidFill>
-                <a:srgbClr val="FF2600"/>
-              </a:solidFill>
-            </a:endParaRPr>
-          </a:p>
-        </p:txBody>
-      </p:sp>
-      <p:sp>
-        <p:nvSpPr>
           <p:cNvPr id="4" name="Rectangle 3">
             <a:extLst>
               <a:ext uri="{FF2B5EF4-FFF2-40B4-BE49-F238E27FC236}">
@@ -28800,53 +28241,360 @@
       </p:sp>
       <p:sp>
         <p:nvSpPr>
-          <p:cNvPr id="6" name="Rectangle 5">
-            <a:extLst>
-              <a:ext uri="{FF2B5EF4-FFF2-40B4-BE49-F238E27FC236}">
-                <a16:creationId xmlns:a16="http://schemas.microsoft.com/office/drawing/2014/main" id="{7872D441-92A2-6F43-90CE-D5E4810DE7CA}"/>
-              </a:ext>
-            </a:extLst>
-          </p:cNvPr>
-          <p:cNvSpPr/>
+          <p:cNvPr id="5" name="TextBox 4"/>
+          <p:cNvSpPr txBox="1"/>
           <p:nvPr/>
         </p:nvSpPr>
         <p:spPr>
           <a:xfrm>
-            <a:off x="2661819" y="3788977"/>
-            <a:ext cx="3270446" cy="1323439"/>
+            <a:off x="190500" y="228600"/>
+            <a:ext cx="8763000" cy="4154984"/>
           </a:xfrm>
           <a:prstGeom prst="rect">
             <a:avLst/>
           </a:prstGeom>
+          <a:noFill/>
         </p:spPr>
         <p:txBody>
-          <a:bodyPr wrap="none">
+          <a:bodyPr wrap="square" rtlCol="0">
             <a:spAutoFit/>
           </a:bodyPr>
           <a:lstStyle/>
           <a:p>
-            <a:pPr algn="ctr"/>
-            <a:r>
-              <a:rPr lang="en-US" sz="8000" b="1" dirty="0">
-                <a:solidFill>
-                  <a:srgbClr val="00B050"/>
-                </a:solidFill>
-                <a:latin typeface="Menlo" panose="020B0609030804020204" pitchFamily="49" charset="0"/>
-              </a:rPr>
-              <a:t>Else </a:t>
-            </a:r>
-            <a:endParaRPr lang="en-US" b="1" dirty="0">
-              <a:solidFill>
-                <a:srgbClr val="00B050"/>
-              </a:solidFill>
-            </a:endParaRPr>
+            <a:r>
+              <a:rPr lang="en-US" sz="2400" dirty="0">
+                <a:solidFill>
+                  <a:srgbClr val="267F99"/>
+                </a:solidFill>
+                <a:latin typeface="Menlo" panose="020B0609030804020204" pitchFamily="49" charset="0"/>
+              </a:rPr>
+              <a:t>int</a:t>
+            </a:r>
+            <a:r>
+              <a:rPr lang="en-US" sz="2400" dirty="0">
+                <a:solidFill>
+                  <a:srgbClr val="000000"/>
+                </a:solidFill>
+                <a:latin typeface="Menlo" panose="020B0609030804020204" pitchFamily="49" charset="0"/>
+              </a:rPr>
+              <a:t> </a:t>
+            </a:r>
+            <a:r>
+              <a:rPr lang="en-US" sz="2400" dirty="0">
+                <a:solidFill>
+                  <a:srgbClr val="001080"/>
+                </a:solidFill>
+                <a:latin typeface="Menlo" panose="020B0609030804020204" pitchFamily="49" charset="0"/>
+              </a:rPr>
+              <a:t>player1</a:t>
+            </a:r>
+            <a:r>
+              <a:rPr lang="en-US" sz="2400" dirty="0">
+                <a:solidFill>
+                  <a:srgbClr val="000000"/>
+                </a:solidFill>
+                <a:latin typeface="Menlo" panose="020B0609030804020204" pitchFamily="49" charset="0"/>
+              </a:rPr>
+              <a:t> = </a:t>
+            </a:r>
+            <a:r>
+              <a:rPr lang="en-US" sz="2400" dirty="0">
+                <a:solidFill>
+                  <a:srgbClr val="098658"/>
+                </a:solidFill>
+                <a:latin typeface="Menlo" panose="020B0609030804020204" pitchFamily="49" charset="0"/>
+              </a:rPr>
+              <a:t>8</a:t>
+            </a:r>
+            <a:r>
+              <a:rPr lang="en-US" sz="2400" dirty="0">
+                <a:solidFill>
+                  <a:srgbClr val="000000"/>
+                </a:solidFill>
+                <a:latin typeface="Menlo" panose="020B0609030804020204" pitchFamily="49" charset="0"/>
+              </a:rPr>
+              <a:t> ;</a:t>
+            </a:r>
+          </a:p>
+          <a:p>
+            <a:r>
+              <a:rPr lang="en-US" sz="2400" dirty="0">
+                <a:solidFill>
+                  <a:srgbClr val="AF00DB"/>
+                </a:solidFill>
+                <a:latin typeface="Menlo" panose="020B0609030804020204" pitchFamily="49" charset="0"/>
+              </a:rPr>
+              <a:t>if</a:t>
+            </a:r>
+            <a:r>
+              <a:rPr lang="en-US" sz="2400" dirty="0">
+                <a:solidFill>
+                  <a:srgbClr val="000000"/>
+                </a:solidFill>
+                <a:latin typeface="Menlo" panose="020B0609030804020204" pitchFamily="49" charset="0"/>
+              </a:rPr>
+              <a:t> (player1 == </a:t>
+            </a:r>
+            <a:r>
+              <a:rPr lang="en-US" sz="2400" dirty="0">
+                <a:solidFill>
+                  <a:srgbClr val="098658"/>
+                </a:solidFill>
+                <a:latin typeface="Menlo" panose="020B0609030804020204" pitchFamily="49" charset="0"/>
+              </a:rPr>
+              <a:t>3</a:t>
+            </a:r>
+            <a:r>
+              <a:rPr lang="en-US" sz="2400" dirty="0">
+                <a:solidFill>
+                  <a:srgbClr val="000000"/>
+                </a:solidFill>
+                <a:latin typeface="Menlo" panose="020B0609030804020204" pitchFamily="49" charset="0"/>
+              </a:rPr>
+              <a:t>){</a:t>
+            </a:r>
+          </a:p>
+          <a:p>
+            <a:r>
+              <a:rPr lang="en-US" sz="2400" dirty="0">
+                <a:solidFill>
+                  <a:srgbClr val="795E26"/>
+                </a:solidFill>
+                <a:latin typeface="Menlo" panose="020B0609030804020204" pitchFamily="49" charset="0"/>
+              </a:rPr>
+              <a:t>say</a:t>
+            </a:r>
+            <a:r>
+              <a:rPr lang="en-US" sz="2400" dirty="0">
+                <a:solidFill>
+                  <a:srgbClr val="000000"/>
+                </a:solidFill>
+                <a:latin typeface="Menlo" panose="020B0609030804020204" pitchFamily="49" charset="0"/>
+              </a:rPr>
+              <a:t>(</a:t>
+            </a:r>
+            <a:r>
+              <a:rPr lang="en-US" sz="2400" dirty="0">
+                <a:solidFill>
+                  <a:srgbClr val="A31515"/>
+                </a:solidFill>
+                <a:latin typeface="Menlo" panose="020B0609030804020204" pitchFamily="49" charset="0"/>
+              </a:rPr>
+              <a:t>"If"</a:t>
+            </a:r>
+            <a:r>
+              <a:rPr lang="en-US" sz="2400" dirty="0">
+                <a:solidFill>
+                  <a:srgbClr val="000000"/>
+                </a:solidFill>
+                <a:latin typeface="Menlo" panose="020B0609030804020204" pitchFamily="49" charset="0"/>
+              </a:rPr>
+              <a:t>);</a:t>
+            </a:r>
+          </a:p>
+          <a:p>
+            <a:r>
+              <a:rPr lang="en-US" sz="2400" dirty="0">
+                <a:solidFill>
+                  <a:srgbClr val="000000"/>
+                </a:solidFill>
+                <a:latin typeface="Menlo" panose="020B0609030804020204" pitchFamily="49" charset="0"/>
+              </a:rPr>
+              <a:t>}</a:t>
+            </a:r>
+          </a:p>
+          <a:p>
+            <a:r>
+              <a:rPr lang="en-US" sz="2400" dirty="0">
+                <a:solidFill>
+                  <a:srgbClr val="AF00DB"/>
+                </a:solidFill>
+                <a:latin typeface="Menlo" panose="020B0609030804020204" pitchFamily="49" charset="0"/>
+              </a:rPr>
+              <a:t>else</a:t>
+            </a:r>
+            <a:r>
+              <a:rPr lang="en-US" sz="2400" dirty="0">
+                <a:solidFill>
+                  <a:srgbClr val="000000"/>
+                </a:solidFill>
+                <a:latin typeface="Menlo" panose="020B0609030804020204" pitchFamily="49" charset="0"/>
+              </a:rPr>
+              <a:t> </a:t>
+            </a:r>
+            <a:r>
+              <a:rPr lang="en-US" sz="2400" dirty="0">
+                <a:solidFill>
+                  <a:srgbClr val="AF00DB"/>
+                </a:solidFill>
+                <a:latin typeface="Menlo" panose="020B0609030804020204" pitchFamily="49" charset="0"/>
+              </a:rPr>
+              <a:t>if</a:t>
+            </a:r>
+            <a:r>
+              <a:rPr lang="en-US" sz="2400" dirty="0">
+                <a:solidFill>
+                  <a:srgbClr val="000000"/>
+                </a:solidFill>
+                <a:latin typeface="Menlo" panose="020B0609030804020204" pitchFamily="49" charset="0"/>
+              </a:rPr>
+              <a:t> (player1 &lt;= </a:t>
+            </a:r>
+            <a:r>
+              <a:rPr lang="en-US" sz="2400" dirty="0">
+                <a:solidFill>
+                  <a:srgbClr val="098658"/>
+                </a:solidFill>
+                <a:latin typeface="Menlo" panose="020B0609030804020204" pitchFamily="49" charset="0"/>
+              </a:rPr>
+              <a:t>8</a:t>
+            </a:r>
+            <a:r>
+              <a:rPr lang="en-US" sz="2400" dirty="0">
+                <a:solidFill>
+                  <a:srgbClr val="000000"/>
+                </a:solidFill>
+                <a:latin typeface="Menlo" panose="020B0609030804020204" pitchFamily="49" charset="0"/>
+              </a:rPr>
+              <a:t>){</a:t>
+            </a:r>
+          </a:p>
+          <a:p>
+            <a:r>
+              <a:rPr lang="en-US" sz="2400" dirty="0">
+                <a:solidFill>
+                  <a:srgbClr val="795E26"/>
+                </a:solidFill>
+                <a:latin typeface="Menlo" panose="020B0609030804020204" pitchFamily="49" charset="0"/>
+              </a:rPr>
+              <a:t>say</a:t>
+            </a:r>
+            <a:r>
+              <a:rPr lang="en-US" sz="2400" dirty="0">
+                <a:solidFill>
+                  <a:srgbClr val="000000"/>
+                </a:solidFill>
+                <a:latin typeface="Menlo" panose="020B0609030804020204" pitchFamily="49" charset="0"/>
+              </a:rPr>
+              <a:t>(</a:t>
+            </a:r>
+            <a:r>
+              <a:rPr lang="en-US" sz="2400" dirty="0">
+                <a:solidFill>
+                  <a:srgbClr val="A31515"/>
+                </a:solidFill>
+                <a:latin typeface="Menlo" panose="020B0609030804020204" pitchFamily="49" charset="0"/>
+              </a:rPr>
+              <a:t>"Else If"</a:t>
+            </a:r>
+            <a:r>
+              <a:rPr lang="en-US" sz="2400" dirty="0">
+                <a:solidFill>
+                  <a:srgbClr val="000000"/>
+                </a:solidFill>
+                <a:latin typeface="Menlo" panose="020B0609030804020204" pitchFamily="49" charset="0"/>
+              </a:rPr>
+              <a:t>);</a:t>
+            </a:r>
+          </a:p>
+          <a:p>
+            <a:r>
+              <a:rPr lang="en-US" sz="2400" dirty="0">
+                <a:solidFill>
+                  <a:srgbClr val="000000"/>
+                </a:solidFill>
+                <a:latin typeface="Menlo" panose="020B0609030804020204" pitchFamily="49" charset="0"/>
+              </a:rPr>
+              <a:t>}</a:t>
+            </a:r>
+          </a:p>
+          <a:p>
+            <a:r>
+              <a:rPr lang="en-US" sz="2400" dirty="0">
+                <a:solidFill>
+                  <a:srgbClr val="AF00DB"/>
+                </a:solidFill>
+                <a:latin typeface="Menlo" panose="020B0609030804020204" pitchFamily="49" charset="0"/>
+              </a:rPr>
+              <a:t>else</a:t>
+            </a:r>
+            <a:r>
+              <a:rPr lang="en-US" sz="2400" dirty="0">
+                <a:solidFill>
+                  <a:srgbClr val="000000"/>
+                </a:solidFill>
+                <a:latin typeface="Menlo" panose="020B0609030804020204" pitchFamily="49" charset="0"/>
+              </a:rPr>
+              <a:t>{</a:t>
+            </a:r>
+          </a:p>
+          <a:p>
+            <a:r>
+              <a:rPr lang="en-US" sz="2400" dirty="0">
+                <a:solidFill>
+                  <a:srgbClr val="795E26"/>
+                </a:solidFill>
+                <a:latin typeface="Menlo" panose="020B0609030804020204" pitchFamily="49" charset="0"/>
+              </a:rPr>
+              <a:t>say</a:t>
+            </a:r>
+            <a:r>
+              <a:rPr lang="en-US" sz="2400" dirty="0">
+                <a:solidFill>
+                  <a:srgbClr val="000000"/>
+                </a:solidFill>
+                <a:latin typeface="Menlo" panose="020B0609030804020204" pitchFamily="49" charset="0"/>
+              </a:rPr>
+              <a:t>(</a:t>
+            </a:r>
+            <a:r>
+              <a:rPr lang="en-US" sz="2400" dirty="0">
+                <a:solidFill>
+                  <a:srgbClr val="A31515"/>
+                </a:solidFill>
+                <a:latin typeface="Menlo" panose="020B0609030804020204" pitchFamily="49" charset="0"/>
+              </a:rPr>
+              <a:t>"Else"</a:t>
+            </a:r>
+            <a:r>
+              <a:rPr lang="en-US" sz="2400" dirty="0">
+                <a:solidFill>
+                  <a:srgbClr val="000000"/>
+                </a:solidFill>
+                <a:latin typeface="Menlo" panose="020B0609030804020204" pitchFamily="49" charset="0"/>
+              </a:rPr>
+              <a:t>);</a:t>
+            </a:r>
+          </a:p>
+          <a:p>
+            <a:r>
+              <a:rPr lang="en-US" sz="2400" dirty="0">
+                <a:solidFill>
+                  <a:srgbClr val="000000"/>
+                </a:solidFill>
+                <a:latin typeface="Menlo" panose="020B0609030804020204" pitchFamily="49" charset="0"/>
+              </a:rPr>
+              <a:t>}</a:t>
+            </a:r>
+          </a:p>
+          <a:p>
+            <a:r>
+              <a:rPr lang="da-DK" sz="2400" dirty="0">
+                <a:solidFill>
+                  <a:srgbClr val="000000"/>
+                </a:solidFill>
+                <a:latin typeface="Monaco"/>
+              </a:rPr>
+              <a:t> </a:t>
+            </a:r>
+            <a:endParaRPr lang="en-US" sz="2400" dirty="0"/>
           </a:p>
         </p:txBody>
       </p:sp>
     </p:spTree>
     <p:extLst>
       <p:ext uri="{BB962C8B-B14F-4D97-AF65-F5344CB8AC3E}">
-        <p14:creationId xmlns:p14="http://schemas.microsoft.com/office/powerpoint/2010/main" val="7022862"/>
+        <p14:creationId xmlns:p14="http://schemas.microsoft.com/office/powerpoint/2010/main" val="1583504553"/>
       </p:ext>
     </p:extLst>
   </p:cSld>
@@ -29239,7 +28987,7 @@
         <p:spPr>
           <a:xfrm>
             <a:off x="190500" y="228600"/>
-            <a:ext cx="8763000" cy="4154984"/>
+            <a:ext cx="8763000" cy="4524315"/>
           </a:xfrm>
           <a:prstGeom prst="rect">
             <a:avLst/>
@@ -29295,7 +29043,7 @@
                 </a:solidFill>
                 <a:latin typeface="Menlo" panose="020B0609030804020204" pitchFamily="49" charset="0"/>
               </a:rPr>
-              <a:t>8</a:t>
+              <a:t>12</a:t>
             </a:r>
             <a:r>
               <a:rPr lang="en-US" sz="2400" dirty="0">
@@ -29324,7 +29072,7 @@
                 </a:solidFill>
                 <a:latin typeface="Menlo" panose="020B0609030804020204" pitchFamily="49" charset="0"/>
               </a:rPr>
-              <a:t> (player1 == </a:t>
+              <a:t> (</a:t>
             </a:r>
             <a:r>
               <a:rPr lang="en-US" sz="2400" dirty="0">
@@ -29333,7 +29081,25 @@
                 </a:solidFill>
                 <a:latin typeface="Menlo" panose="020B0609030804020204" pitchFamily="49" charset="0"/>
               </a:rPr>
-              <a:t>3</a:t>
+              <a:t>1</a:t>
+            </a:r>
+            <a:r>
+              <a:rPr lang="en-US" sz="2400" dirty="0">
+                <a:solidFill>
+                  <a:srgbClr val="000000"/>
+                </a:solidFill>
+                <a:latin typeface="Menlo" panose="020B0609030804020204" pitchFamily="49" charset="0"/>
+              </a:rPr>
+              <a:t> &lt; player1 &amp;&amp; player1 &lt; </a:t>
+            </a:r>
+            <a:r>
+              <a:rPr lang="en-US" sz="2400" dirty="0">
+                <a:solidFill>
+                  <a:srgbClr val="098658"/>
+                </a:solidFill>
+                <a:latin typeface="Menlo" panose="020B0609030804020204" pitchFamily="49" charset="0"/>
+              </a:rPr>
+              <a:t>10</a:t>
             </a:r>
             <a:r>
               <a:rPr lang="en-US" sz="2400" dirty="0">
@@ -29429,7 +29195,7 @@
                 </a:solidFill>
                 <a:latin typeface="Menlo" panose="020B0609030804020204" pitchFamily="49" charset="0"/>
               </a:rPr>
-              <a:t> (player1 &lt;= </a:t>
+              <a:t> (</a:t>
             </a:r>
             <a:r>
               <a:rPr lang="en-US" sz="2400" dirty="0">
@@ -29438,7 +29204,25 @@
                 </a:solidFill>
                 <a:latin typeface="Menlo" panose="020B0609030804020204" pitchFamily="49" charset="0"/>
               </a:rPr>
-              <a:t>8</a:t>
+              <a:t>10</a:t>
+            </a:r>
+            <a:r>
+              <a:rPr lang="en-US" sz="2400" dirty="0">
+                <a:solidFill>
+                  <a:srgbClr val="000000"/>
+                </a:solidFill>
+                <a:latin typeface="Menlo" panose="020B0609030804020204" pitchFamily="49" charset="0"/>
+              </a:rPr>
+              <a:t> &lt; player1 &amp;&amp; player1 &lt; </a:t>
+            </a:r>
+            <a:r>
+              <a:rPr lang="en-US" sz="2400" dirty="0">
+                <a:solidFill>
+                  <a:srgbClr val="098658"/>
+                </a:solidFill>
+                <a:latin typeface="Menlo" panose="020B0609030804020204" pitchFamily="49" charset="0"/>
+              </a:rPr>
+              <a:t>20</a:t>
             </a:r>
             <a:r>
               <a:rPr lang="en-US" sz="2400" dirty="0">
@@ -29569,15 +29353,14 @@
             </a:r>
           </a:p>
           <a:p>
-            <a:r>
-              <a:rPr lang="da-DK" sz="2400" dirty="0">
-                <a:solidFill>
-                  <a:srgbClr val="000000"/>
-                </a:solidFill>
-                <a:latin typeface="Monaco"/>
-              </a:rPr>
-              <a:t> </a:t>
-            </a:r>
+            <a:br>
+              <a:rPr lang="en-US" sz="2400" dirty="0">
+                <a:solidFill>
+                  <a:srgbClr val="000000"/>
+                </a:solidFill>
+                <a:latin typeface="Menlo" panose="020B0609030804020204" pitchFamily="49" charset="0"/>
+              </a:rPr>
+            </a:br>
             <a:endParaRPr lang="en-US" sz="2400" dirty="0"/>
           </a:p>
         </p:txBody>
@@ -29585,7 +29368,7 @@
     </p:spTree>
     <p:extLst>
       <p:ext uri="{BB962C8B-B14F-4D97-AF65-F5344CB8AC3E}">
-        <p14:creationId xmlns:p14="http://schemas.microsoft.com/office/powerpoint/2010/main" val="850790500"/>
+        <p14:creationId xmlns:p14="http://schemas.microsoft.com/office/powerpoint/2010/main" val="632559102"/>
       </p:ext>
     </p:extLst>
   </p:cSld>
@@ -29667,7 +29450,7 @@
         <p:spPr>
           <a:xfrm>
             <a:off x="190500" y="228600"/>
-            <a:ext cx="8763000" cy="4154984"/>
+            <a:ext cx="8763000" cy="4524315"/>
           </a:xfrm>
           <a:prstGeom prst="rect">
             <a:avLst/>
@@ -29723,7 +29506,7 @@
                 </a:solidFill>
                 <a:latin typeface="Menlo" panose="020B0609030804020204" pitchFamily="49" charset="0"/>
               </a:rPr>
-              <a:t>8</a:t>
+              <a:t>12</a:t>
             </a:r>
             <a:r>
               <a:rPr lang="en-US" sz="2400" dirty="0">
@@ -29752,7 +29535,7 @@
                 </a:solidFill>
                 <a:latin typeface="Menlo" panose="020B0609030804020204" pitchFamily="49" charset="0"/>
               </a:rPr>
-              <a:t> (player1 == </a:t>
+              <a:t> (</a:t>
             </a:r>
             <a:r>
               <a:rPr lang="en-US" sz="2400" dirty="0">
@@ -29761,7 +29544,25 @@
                 </a:solidFill>
                 <a:latin typeface="Menlo" panose="020B0609030804020204" pitchFamily="49" charset="0"/>
               </a:rPr>
-              <a:t>3</a:t>
+              <a:t>1</a:t>
+            </a:r>
+            <a:r>
+              <a:rPr lang="en-US" sz="2400" dirty="0">
+                <a:solidFill>
+                  <a:srgbClr val="000000"/>
+                </a:solidFill>
+                <a:latin typeface="Menlo" panose="020B0609030804020204" pitchFamily="49" charset="0"/>
+              </a:rPr>
+              <a:t> &lt; player1 &amp;&amp; player1 &lt; </a:t>
+            </a:r>
+            <a:r>
+              <a:rPr lang="en-US" sz="2400" dirty="0">
+                <a:solidFill>
+                  <a:srgbClr val="098658"/>
+                </a:solidFill>
+                <a:latin typeface="Menlo" panose="020B0609030804020204" pitchFamily="49" charset="0"/>
+              </a:rPr>
+              <a:t>10</a:t>
             </a:r>
             <a:r>
               <a:rPr lang="en-US" sz="2400" dirty="0">
@@ -29857,7 +29658,7 @@
                 </a:solidFill>
                 <a:latin typeface="Menlo" panose="020B0609030804020204" pitchFamily="49" charset="0"/>
               </a:rPr>
-              <a:t> (player1 &lt;= </a:t>
+              <a:t> (</a:t>
             </a:r>
             <a:r>
               <a:rPr lang="en-US" sz="2400" dirty="0">
@@ -29866,7 +29667,25 @@
                 </a:solidFill>
                 <a:latin typeface="Menlo" panose="020B0609030804020204" pitchFamily="49" charset="0"/>
               </a:rPr>
-              <a:t>8</a:t>
+              <a:t>10</a:t>
+            </a:r>
+            <a:r>
+              <a:rPr lang="en-US" sz="2400" dirty="0">
+                <a:solidFill>
+                  <a:srgbClr val="000000"/>
+                </a:solidFill>
+                <a:latin typeface="Menlo" panose="020B0609030804020204" pitchFamily="49" charset="0"/>
+              </a:rPr>
+              <a:t> &lt; player1 &amp;&amp; player1 &lt; </a:t>
+            </a:r>
+            <a:r>
+              <a:rPr lang="en-US" sz="2400" dirty="0">
+                <a:solidFill>
+                  <a:srgbClr val="098658"/>
+                </a:solidFill>
+                <a:latin typeface="Menlo" panose="020B0609030804020204" pitchFamily="49" charset="0"/>
+              </a:rPr>
+              <a:t>20</a:t>
             </a:r>
             <a:r>
               <a:rPr lang="en-US" sz="2400" dirty="0">
@@ -29997,15 +29816,14 @@
             </a:r>
           </a:p>
           <a:p>
-            <a:r>
-              <a:rPr lang="da-DK" sz="2400" dirty="0">
-                <a:solidFill>
-                  <a:srgbClr val="000000"/>
-                </a:solidFill>
-                <a:latin typeface="Monaco"/>
-              </a:rPr>
-              <a:t> </a:t>
-            </a:r>
+            <a:br>
+              <a:rPr lang="en-US" sz="2400" dirty="0">
+                <a:solidFill>
+                  <a:srgbClr val="000000"/>
+                </a:solidFill>
+                <a:latin typeface="Menlo" panose="020B0609030804020204" pitchFamily="49" charset="0"/>
+              </a:rPr>
+            </a:br>
             <a:endParaRPr lang="en-US" sz="2400" dirty="0"/>
           </a:p>
         </p:txBody>
@@ -30013,7 +29831,7 @@
     </p:spTree>
     <p:extLst>
       <p:ext uri="{BB962C8B-B14F-4D97-AF65-F5344CB8AC3E}">
-        <p14:creationId xmlns:p14="http://schemas.microsoft.com/office/powerpoint/2010/main" val="1583504553"/>
+        <p14:creationId xmlns:p14="http://schemas.microsoft.com/office/powerpoint/2010/main" val="333660051"/>
       </p:ext>
     </p:extLst>
   </p:cSld>
@@ -30106,7 +29924,7 @@
                 </a:solidFill>
                 <a:latin typeface="Menlo" panose="020B0609030804020204" pitchFamily="49" charset="0"/>
               </a:rPr>
-              <a:t>12</a:t>
+              <a:t>4</a:t>
             </a:r>
             <a:r>
               <a:rPr lang="en-US" sz="2400" dirty="0">
@@ -30431,7 +30249,7 @@
     </p:spTree>
     <p:extLst>
       <p:ext uri="{BB962C8B-B14F-4D97-AF65-F5344CB8AC3E}">
-        <p14:creationId xmlns:p14="http://schemas.microsoft.com/office/powerpoint/2010/main" val="632559102"/>
+        <p14:creationId xmlns:p14="http://schemas.microsoft.com/office/powerpoint/2010/main" val="4197776215"/>
       </p:ext>
     </p:extLst>
   </p:cSld>
@@ -30461,51 +30279,6 @@
       </p:grpSpPr>
       <p:sp>
         <p:nvSpPr>
-          <p:cNvPr id="4" name="Rectangle 3">
-            <a:extLst>
-              <a:ext uri="{FF2B5EF4-FFF2-40B4-BE49-F238E27FC236}">
-                <a16:creationId xmlns:a16="http://schemas.microsoft.com/office/drawing/2014/main" id="{C3864E34-FDD4-C944-988F-EA845CFA951E}"/>
-              </a:ext>
-            </a:extLst>
-          </p:cNvPr>
-          <p:cNvSpPr/>
-          <p:nvPr/>
-        </p:nvSpPr>
-        <p:spPr>
-          <a:xfrm>
-            <a:off x="2044663" y="3809999"/>
-            <a:ext cx="4504759" cy="1323439"/>
-          </a:xfrm>
-          <a:prstGeom prst="rect">
-            <a:avLst/>
-          </a:prstGeom>
-        </p:spPr>
-        <p:txBody>
-          <a:bodyPr wrap="none">
-            <a:spAutoFit/>
-          </a:bodyPr>
-          <a:lstStyle/>
-          <a:p>
-            <a:pPr algn="ctr"/>
-            <a:r>
-              <a:rPr lang="en-US" sz="8000" b="1" dirty="0">
-                <a:solidFill>
-                  <a:srgbClr val="0070C0"/>
-                </a:solidFill>
-                <a:latin typeface="Menlo" panose="020B0609030804020204" pitchFamily="49" charset="0"/>
-              </a:rPr>
-              <a:t>Else If</a:t>
-            </a:r>
-            <a:endParaRPr lang="en-US" b="1" dirty="0">
-              <a:solidFill>
-                <a:srgbClr val="0070C0"/>
-              </a:solidFill>
-            </a:endParaRPr>
-          </a:p>
-        </p:txBody>
-      </p:sp>
-      <p:sp>
-        <p:nvSpPr>
           <p:cNvPr id="5" name="TextBox 4"/>
           <p:cNvSpPr txBox="1"/>
           <p:nvPr/>
@@ -30569,7 +30342,7 @@
                 </a:solidFill>
                 <a:latin typeface="Menlo" panose="020B0609030804020204" pitchFamily="49" charset="0"/>
               </a:rPr>
-              <a:t>12</a:t>
+              <a:t>4</a:t>
             </a:r>
             <a:r>
               <a:rPr lang="en-US" sz="2400" dirty="0">
@@ -30888,13 +30661,58 @@
               </a:rPr>
             </a:br>
             <a:endParaRPr lang="en-US" sz="2400" dirty="0"/>
+          </a:p>
+        </p:txBody>
+      </p:sp>
+      <p:sp>
+        <p:nvSpPr>
+          <p:cNvPr id="2" name="Rectangle 1">
+            <a:extLst>
+              <a:ext uri="{FF2B5EF4-FFF2-40B4-BE49-F238E27FC236}">
+                <a16:creationId xmlns:a16="http://schemas.microsoft.com/office/drawing/2014/main" id="{4FD6FC00-FF3A-D54F-9E80-71ADFA594ED1}"/>
+              </a:ext>
+            </a:extLst>
+          </p:cNvPr>
+          <p:cNvSpPr/>
+          <p:nvPr/>
+        </p:nvSpPr>
+        <p:spPr>
+          <a:xfrm>
+            <a:off x="3587553" y="3810000"/>
+            <a:ext cx="1418978" cy="1323439"/>
+          </a:xfrm>
+          <a:prstGeom prst="rect">
+            <a:avLst/>
+          </a:prstGeom>
+        </p:spPr>
+        <p:txBody>
+          <a:bodyPr wrap="none">
+            <a:spAutoFit/>
+          </a:bodyPr>
+          <a:lstStyle/>
+          <a:p>
+            <a:pPr algn="ctr"/>
+            <a:r>
+              <a:rPr lang="en-US" sz="8000" b="1" dirty="0">
+                <a:solidFill>
+                  <a:srgbClr val="FF2600"/>
+                </a:solidFill>
+                <a:latin typeface="Menlo" panose="020B0609030804020204" pitchFamily="49" charset="0"/>
+              </a:rPr>
+              <a:t>If</a:t>
+            </a:r>
+            <a:endParaRPr lang="en-US" b="1" dirty="0">
+              <a:solidFill>
+                <a:srgbClr val="FF2600"/>
+              </a:solidFill>
+            </a:endParaRPr>
           </a:p>
         </p:txBody>
       </p:sp>
     </p:spTree>
     <p:extLst>
       <p:ext uri="{BB962C8B-B14F-4D97-AF65-F5344CB8AC3E}">
-        <p14:creationId xmlns:p14="http://schemas.microsoft.com/office/powerpoint/2010/main" val="333660051"/>
+        <p14:creationId xmlns:p14="http://schemas.microsoft.com/office/powerpoint/2010/main" val="2777974597"/>
       </p:ext>
     </p:extLst>
   </p:cSld>
@@ -30987,7 +30805,7 @@
                 </a:solidFill>
                 <a:latin typeface="Menlo" panose="020B0609030804020204" pitchFamily="49" charset="0"/>
               </a:rPr>
-              <a:t>4</a:t>
+              <a:t>27</a:t>
             </a:r>
             <a:r>
               <a:rPr lang="en-US" sz="2400" dirty="0">
@@ -31312,7 +31130,7 @@
     </p:spTree>
     <p:extLst>
       <p:ext uri="{BB962C8B-B14F-4D97-AF65-F5344CB8AC3E}">
-        <p14:creationId xmlns:p14="http://schemas.microsoft.com/office/powerpoint/2010/main" val="4197776215"/>
+        <p14:creationId xmlns:p14="http://schemas.microsoft.com/office/powerpoint/2010/main" val="1659743742"/>
       </p:ext>
     </p:extLst>
   </p:cSld>
@@ -31342,6 +31160,51 @@
       </p:grpSpPr>
       <p:sp>
         <p:nvSpPr>
+          <p:cNvPr id="6" name="Rectangle 5">
+            <a:extLst>
+              <a:ext uri="{FF2B5EF4-FFF2-40B4-BE49-F238E27FC236}">
+                <a16:creationId xmlns:a16="http://schemas.microsoft.com/office/drawing/2014/main" id="{7872D441-92A2-6F43-90CE-D5E4810DE7CA}"/>
+              </a:ext>
+            </a:extLst>
+          </p:cNvPr>
+          <p:cNvSpPr/>
+          <p:nvPr/>
+        </p:nvSpPr>
+        <p:spPr>
+          <a:xfrm>
+            <a:off x="2661819" y="3788977"/>
+            <a:ext cx="3270446" cy="1323439"/>
+          </a:xfrm>
+          <a:prstGeom prst="rect">
+            <a:avLst/>
+          </a:prstGeom>
+        </p:spPr>
+        <p:txBody>
+          <a:bodyPr wrap="none">
+            <a:spAutoFit/>
+          </a:bodyPr>
+          <a:lstStyle/>
+          <a:p>
+            <a:pPr algn="ctr"/>
+            <a:r>
+              <a:rPr lang="en-US" sz="8000" b="1" dirty="0">
+                <a:solidFill>
+                  <a:srgbClr val="00B050"/>
+                </a:solidFill>
+                <a:latin typeface="Menlo" panose="020B0609030804020204" pitchFamily="49" charset="0"/>
+              </a:rPr>
+              <a:t>Else </a:t>
+            </a:r>
+            <a:endParaRPr lang="en-US" b="1" dirty="0">
+              <a:solidFill>
+                <a:srgbClr val="00B050"/>
+              </a:solidFill>
+            </a:endParaRPr>
+          </a:p>
+        </p:txBody>
+      </p:sp>
+      <p:sp>
+        <p:nvSpPr>
           <p:cNvPr id="5" name="TextBox 4"/>
           <p:cNvSpPr txBox="1"/>
           <p:nvPr/>
@@ -31405,7 +31268,7 @@
                 </a:solidFill>
                 <a:latin typeface="Menlo" panose="020B0609030804020204" pitchFamily="49" charset="0"/>
               </a:rPr>
-              <a:t>4</a:t>
+              <a:t>27</a:t>
             </a:r>
             <a:r>
               <a:rPr lang="en-US" sz="2400" dirty="0">
@@ -31724,58 +31587,13 @@
               </a:rPr>
             </a:br>
             <a:endParaRPr lang="en-US" sz="2400" dirty="0"/>
-          </a:p>
-        </p:txBody>
-      </p:sp>
-      <p:sp>
-        <p:nvSpPr>
-          <p:cNvPr id="2" name="Rectangle 1">
-            <a:extLst>
-              <a:ext uri="{FF2B5EF4-FFF2-40B4-BE49-F238E27FC236}">
-                <a16:creationId xmlns:a16="http://schemas.microsoft.com/office/drawing/2014/main" id="{4FD6FC00-FF3A-D54F-9E80-71ADFA594ED1}"/>
-              </a:ext>
-            </a:extLst>
-          </p:cNvPr>
-          <p:cNvSpPr/>
-          <p:nvPr/>
-        </p:nvSpPr>
-        <p:spPr>
-          <a:xfrm>
-            <a:off x="3587553" y="3810000"/>
-            <a:ext cx="1418978" cy="1323439"/>
-          </a:xfrm>
-          <a:prstGeom prst="rect">
-            <a:avLst/>
-          </a:prstGeom>
-        </p:spPr>
-        <p:txBody>
-          <a:bodyPr wrap="none">
-            <a:spAutoFit/>
-          </a:bodyPr>
-          <a:lstStyle/>
-          <a:p>
-            <a:pPr algn="ctr"/>
-            <a:r>
-              <a:rPr lang="en-US" sz="8000" b="1" dirty="0">
-                <a:solidFill>
-                  <a:srgbClr val="FF2600"/>
-                </a:solidFill>
-                <a:latin typeface="Menlo" panose="020B0609030804020204" pitchFamily="49" charset="0"/>
-              </a:rPr>
-              <a:t>If</a:t>
-            </a:r>
-            <a:endParaRPr lang="en-US" b="1" dirty="0">
-              <a:solidFill>
-                <a:srgbClr val="FF2600"/>
-              </a:solidFill>
-            </a:endParaRPr>
           </a:p>
         </p:txBody>
       </p:sp>
     </p:spTree>
     <p:extLst>
       <p:ext uri="{BB962C8B-B14F-4D97-AF65-F5344CB8AC3E}">
-        <p14:creationId xmlns:p14="http://schemas.microsoft.com/office/powerpoint/2010/main" val="2777974597"/>
+        <p14:creationId xmlns:p14="http://schemas.microsoft.com/office/powerpoint/2010/main" val="3432061910"/>
       </p:ext>
     </p:extLst>
   </p:cSld>
@@ -31868,887 +31686,6 @@
                 </a:solidFill>
                 <a:latin typeface="Menlo" panose="020B0609030804020204" pitchFamily="49" charset="0"/>
               </a:rPr>
-              <a:t>27</a:t>
-            </a:r>
-            <a:r>
-              <a:rPr lang="en-US" sz="2400" dirty="0">
-                <a:solidFill>
-                  <a:srgbClr val="000000"/>
-                </a:solidFill>
-                <a:latin typeface="Menlo" panose="020B0609030804020204" pitchFamily="49" charset="0"/>
-              </a:rPr>
-              <a:t> ;</a:t>
-            </a:r>
-          </a:p>
-          <a:p>
-            <a:r>
-              <a:rPr lang="en-US" sz="2400" dirty="0">
-                <a:solidFill>
-                  <a:srgbClr val="AF00DB"/>
-                </a:solidFill>
-                <a:latin typeface="Menlo" panose="020B0609030804020204" pitchFamily="49" charset="0"/>
-              </a:rPr>
-              <a:t>if</a:t>
-            </a:r>
-            <a:r>
-              <a:rPr lang="en-US" sz="2400" dirty="0">
-                <a:solidFill>
-                  <a:srgbClr val="000000"/>
-                </a:solidFill>
-                <a:latin typeface="Menlo" panose="020B0609030804020204" pitchFamily="49" charset="0"/>
-              </a:rPr>
-              <a:t> (</a:t>
-            </a:r>
-            <a:r>
-              <a:rPr lang="en-US" sz="2400" dirty="0">
-                <a:solidFill>
-                  <a:srgbClr val="098658"/>
-                </a:solidFill>
-                <a:latin typeface="Menlo" panose="020B0609030804020204" pitchFamily="49" charset="0"/>
-              </a:rPr>
-              <a:t>1</a:t>
-            </a:r>
-            <a:r>
-              <a:rPr lang="en-US" sz="2400" dirty="0">
-                <a:solidFill>
-                  <a:srgbClr val="000000"/>
-                </a:solidFill>
-                <a:latin typeface="Menlo" panose="020B0609030804020204" pitchFamily="49" charset="0"/>
-              </a:rPr>
-              <a:t> &lt; player1 &amp;&amp; player1 &lt; </a:t>
-            </a:r>
-            <a:r>
-              <a:rPr lang="en-US" sz="2400" dirty="0">
-                <a:solidFill>
-                  <a:srgbClr val="098658"/>
-                </a:solidFill>
-                <a:latin typeface="Menlo" panose="020B0609030804020204" pitchFamily="49" charset="0"/>
-              </a:rPr>
-              <a:t>10</a:t>
-            </a:r>
-            <a:r>
-              <a:rPr lang="en-US" sz="2400" dirty="0">
-                <a:solidFill>
-                  <a:srgbClr val="000000"/>
-                </a:solidFill>
-                <a:latin typeface="Menlo" panose="020B0609030804020204" pitchFamily="49" charset="0"/>
-              </a:rPr>
-              <a:t>){</a:t>
-            </a:r>
-          </a:p>
-          <a:p>
-            <a:r>
-              <a:rPr lang="en-US" sz="2400" dirty="0">
-                <a:solidFill>
-                  <a:srgbClr val="795E26"/>
-                </a:solidFill>
-                <a:latin typeface="Menlo" panose="020B0609030804020204" pitchFamily="49" charset="0"/>
-              </a:rPr>
-              <a:t>say</a:t>
-            </a:r>
-            <a:r>
-              <a:rPr lang="en-US" sz="2400" dirty="0">
-                <a:solidFill>
-                  <a:srgbClr val="000000"/>
-                </a:solidFill>
-                <a:latin typeface="Menlo" panose="020B0609030804020204" pitchFamily="49" charset="0"/>
-              </a:rPr>
-              <a:t>(</a:t>
-            </a:r>
-            <a:r>
-              <a:rPr lang="en-US" sz="2400" dirty="0">
-                <a:solidFill>
-                  <a:srgbClr val="A31515"/>
-                </a:solidFill>
-                <a:latin typeface="Menlo" panose="020B0609030804020204" pitchFamily="49" charset="0"/>
-              </a:rPr>
-              <a:t>"If"</a:t>
-            </a:r>
-            <a:r>
-              <a:rPr lang="en-US" sz="2400" dirty="0">
-                <a:solidFill>
-                  <a:srgbClr val="000000"/>
-                </a:solidFill>
-                <a:latin typeface="Menlo" panose="020B0609030804020204" pitchFamily="49" charset="0"/>
-              </a:rPr>
-              <a:t>);</a:t>
-            </a:r>
-          </a:p>
-          <a:p>
-            <a:r>
-              <a:rPr lang="en-US" sz="2400" dirty="0">
-                <a:solidFill>
-                  <a:srgbClr val="000000"/>
-                </a:solidFill>
-                <a:latin typeface="Menlo" panose="020B0609030804020204" pitchFamily="49" charset="0"/>
-              </a:rPr>
-              <a:t>}</a:t>
-            </a:r>
-          </a:p>
-          <a:p>
-            <a:r>
-              <a:rPr lang="en-US" sz="2400" dirty="0">
-                <a:solidFill>
-                  <a:srgbClr val="AF00DB"/>
-                </a:solidFill>
-                <a:latin typeface="Menlo" panose="020B0609030804020204" pitchFamily="49" charset="0"/>
-              </a:rPr>
-              <a:t>else</a:t>
-            </a:r>
-            <a:r>
-              <a:rPr lang="en-US" sz="2400" dirty="0">
-                <a:solidFill>
-                  <a:srgbClr val="000000"/>
-                </a:solidFill>
-                <a:latin typeface="Menlo" panose="020B0609030804020204" pitchFamily="49" charset="0"/>
-              </a:rPr>
-              <a:t> </a:t>
-            </a:r>
-            <a:r>
-              <a:rPr lang="en-US" sz="2400" dirty="0">
-                <a:solidFill>
-                  <a:srgbClr val="AF00DB"/>
-                </a:solidFill>
-                <a:latin typeface="Menlo" panose="020B0609030804020204" pitchFamily="49" charset="0"/>
-              </a:rPr>
-              <a:t>if</a:t>
-            </a:r>
-            <a:r>
-              <a:rPr lang="en-US" sz="2400" dirty="0">
-                <a:solidFill>
-                  <a:srgbClr val="000000"/>
-                </a:solidFill>
-                <a:latin typeface="Menlo" panose="020B0609030804020204" pitchFamily="49" charset="0"/>
-              </a:rPr>
-              <a:t> (</a:t>
-            </a:r>
-            <a:r>
-              <a:rPr lang="en-US" sz="2400" dirty="0">
-                <a:solidFill>
-                  <a:srgbClr val="098658"/>
-                </a:solidFill>
-                <a:latin typeface="Menlo" panose="020B0609030804020204" pitchFamily="49" charset="0"/>
-              </a:rPr>
-              <a:t>10</a:t>
-            </a:r>
-            <a:r>
-              <a:rPr lang="en-US" sz="2400" dirty="0">
-                <a:solidFill>
-                  <a:srgbClr val="000000"/>
-                </a:solidFill>
-                <a:latin typeface="Menlo" panose="020B0609030804020204" pitchFamily="49" charset="0"/>
-              </a:rPr>
-              <a:t> &lt; player1 &amp;&amp; player1 &lt; </a:t>
-            </a:r>
-            <a:r>
-              <a:rPr lang="en-US" sz="2400" dirty="0">
-                <a:solidFill>
-                  <a:srgbClr val="098658"/>
-                </a:solidFill>
-                <a:latin typeface="Menlo" panose="020B0609030804020204" pitchFamily="49" charset="0"/>
-              </a:rPr>
-              <a:t>20</a:t>
-            </a:r>
-            <a:r>
-              <a:rPr lang="en-US" sz="2400" dirty="0">
-                <a:solidFill>
-                  <a:srgbClr val="000000"/>
-                </a:solidFill>
-                <a:latin typeface="Menlo" panose="020B0609030804020204" pitchFamily="49" charset="0"/>
-              </a:rPr>
-              <a:t>){</a:t>
-            </a:r>
-          </a:p>
-          <a:p>
-            <a:r>
-              <a:rPr lang="en-US" sz="2400" dirty="0">
-                <a:solidFill>
-                  <a:srgbClr val="795E26"/>
-                </a:solidFill>
-                <a:latin typeface="Menlo" panose="020B0609030804020204" pitchFamily="49" charset="0"/>
-              </a:rPr>
-              <a:t>say</a:t>
-            </a:r>
-            <a:r>
-              <a:rPr lang="en-US" sz="2400" dirty="0">
-                <a:solidFill>
-                  <a:srgbClr val="000000"/>
-                </a:solidFill>
-                <a:latin typeface="Menlo" panose="020B0609030804020204" pitchFamily="49" charset="0"/>
-              </a:rPr>
-              <a:t>(</a:t>
-            </a:r>
-            <a:r>
-              <a:rPr lang="en-US" sz="2400" dirty="0">
-                <a:solidFill>
-                  <a:srgbClr val="A31515"/>
-                </a:solidFill>
-                <a:latin typeface="Menlo" panose="020B0609030804020204" pitchFamily="49" charset="0"/>
-              </a:rPr>
-              <a:t>"Else If"</a:t>
-            </a:r>
-            <a:r>
-              <a:rPr lang="en-US" sz="2400" dirty="0">
-                <a:solidFill>
-                  <a:srgbClr val="000000"/>
-                </a:solidFill>
-                <a:latin typeface="Menlo" panose="020B0609030804020204" pitchFamily="49" charset="0"/>
-              </a:rPr>
-              <a:t>);</a:t>
-            </a:r>
-          </a:p>
-          <a:p>
-            <a:r>
-              <a:rPr lang="en-US" sz="2400" dirty="0">
-                <a:solidFill>
-                  <a:srgbClr val="000000"/>
-                </a:solidFill>
-                <a:latin typeface="Menlo" panose="020B0609030804020204" pitchFamily="49" charset="0"/>
-              </a:rPr>
-              <a:t>}</a:t>
-            </a:r>
-          </a:p>
-          <a:p>
-            <a:r>
-              <a:rPr lang="en-US" sz="2400" dirty="0">
-                <a:solidFill>
-                  <a:srgbClr val="AF00DB"/>
-                </a:solidFill>
-                <a:latin typeface="Menlo" panose="020B0609030804020204" pitchFamily="49" charset="0"/>
-              </a:rPr>
-              <a:t>else</a:t>
-            </a:r>
-            <a:r>
-              <a:rPr lang="en-US" sz="2400" dirty="0">
-                <a:solidFill>
-                  <a:srgbClr val="000000"/>
-                </a:solidFill>
-                <a:latin typeface="Menlo" panose="020B0609030804020204" pitchFamily="49" charset="0"/>
-              </a:rPr>
-              <a:t>{</a:t>
-            </a:r>
-          </a:p>
-          <a:p>
-            <a:r>
-              <a:rPr lang="en-US" sz="2400" dirty="0">
-                <a:solidFill>
-                  <a:srgbClr val="795E26"/>
-                </a:solidFill>
-                <a:latin typeface="Menlo" panose="020B0609030804020204" pitchFamily="49" charset="0"/>
-              </a:rPr>
-              <a:t>say</a:t>
-            </a:r>
-            <a:r>
-              <a:rPr lang="en-US" sz="2400" dirty="0">
-                <a:solidFill>
-                  <a:srgbClr val="000000"/>
-                </a:solidFill>
-                <a:latin typeface="Menlo" panose="020B0609030804020204" pitchFamily="49" charset="0"/>
-              </a:rPr>
-              <a:t>(</a:t>
-            </a:r>
-            <a:r>
-              <a:rPr lang="en-US" sz="2400" dirty="0">
-                <a:solidFill>
-                  <a:srgbClr val="A31515"/>
-                </a:solidFill>
-                <a:latin typeface="Menlo" panose="020B0609030804020204" pitchFamily="49" charset="0"/>
-              </a:rPr>
-              <a:t>"Else"</a:t>
-            </a:r>
-            <a:r>
-              <a:rPr lang="en-US" sz="2400" dirty="0">
-                <a:solidFill>
-                  <a:srgbClr val="000000"/>
-                </a:solidFill>
-                <a:latin typeface="Menlo" panose="020B0609030804020204" pitchFamily="49" charset="0"/>
-              </a:rPr>
-              <a:t>);</a:t>
-            </a:r>
-          </a:p>
-          <a:p>
-            <a:r>
-              <a:rPr lang="en-US" sz="2400" dirty="0">
-                <a:solidFill>
-                  <a:srgbClr val="000000"/>
-                </a:solidFill>
-                <a:latin typeface="Menlo" panose="020B0609030804020204" pitchFamily="49" charset="0"/>
-              </a:rPr>
-              <a:t>}</a:t>
-            </a:r>
-          </a:p>
-          <a:p>
-            <a:br>
-              <a:rPr lang="en-US" sz="2400" dirty="0">
-                <a:solidFill>
-                  <a:srgbClr val="000000"/>
-                </a:solidFill>
-                <a:latin typeface="Menlo" panose="020B0609030804020204" pitchFamily="49" charset="0"/>
-              </a:rPr>
-            </a:br>
-            <a:endParaRPr lang="en-US" sz="2400" dirty="0"/>
-          </a:p>
-        </p:txBody>
-      </p:sp>
-    </p:spTree>
-    <p:extLst>
-      <p:ext uri="{BB962C8B-B14F-4D97-AF65-F5344CB8AC3E}">
-        <p14:creationId xmlns:p14="http://schemas.microsoft.com/office/powerpoint/2010/main" val="1659743742"/>
-      </p:ext>
-    </p:extLst>
-  </p:cSld>
-  <p:clrMapOvr>
-    <a:masterClrMapping/>
-  </p:clrMapOvr>
-  <p:transition advClick="0" advTm="5000"/>
-</p:sld>
-</file>
-
-<file path=ppt/slides/slide67.xml><?xml version="1.0" encoding="utf-8"?>
-<p:sld xmlns:a="http://schemas.openxmlformats.org/drawingml/2006/main" xmlns:r="http://schemas.openxmlformats.org/officeDocument/2006/relationships" xmlns:p="http://schemas.openxmlformats.org/presentationml/2006/main">
-  <p:cSld>
-    <p:spTree>
-      <p:nvGrpSpPr>
-        <p:cNvPr id="1" name=""/>
-        <p:cNvGrpSpPr/>
-        <p:nvPr/>
-      </p:nvGrpSpPr>
-      <p:grpSpPr>
-        <a:xfrm>
-          <a:off x="0" y="0"/>
-          <a:ext cx="0" cy="0"/>
-          <a:chOff x="0" y="0"/>
-          <a:chExt cx="0" cy="0"/>
-        </a:xfrm>
-      </p:grpSpPr>
-      <p:sp>
-        <p:nvSpPr>
-          <p:cNvPr id="6" name="Rectangle 5">
-            <a:extLst>
-              <a:ext uri="{FF2B5EF4-FFF2-40B4-BE49-F238E27FC236}">
-                <a16:creationId xmlns:a16="http://schemas.microsoft.com/office/drawing/2014/main" id="{7872D441-92A2-6F43-90CE-D5E4810DE7CA}"/>
-              </a:ext>
-            </a:extLst>
-          </p:cNvPr>
-          <p:cNvSpPr/>
-          <p:nvPr/>
-        </p:nvSpPr>
-        <p:spPr>
-          <a:xfrm>
-            <a:off x="2661819" y="3788977"/>
-            <a:ext cx="3270446" cy="1323439"/>
-          </a:xfrm>
-          <a:prstGeom prst="rect">
-            <a:avLst/>
-          </a:prstGeom>
-        </p:spPr>
-        <p:txBody>
-          <a:bodyPr wrap="none">
-            <a:spAutoFit/>
-          </a:bodyPr>
-          <a:lstStyle/>
-          <a:p>
-            <a:pPr algn="ctr"/>
-            <a:r>
-              <a:rPr lang="en-US" sz="8000" b="1" dirty="0">
-                <a:solidFill>
-                  <a:srgbClr val="00B050"/>
-                </a:solidFill>
-                <a:latin typeface="Menlo" panose="020B0609030804020204" pitchFamily="49" charset="0"/>
-              </a:rPr>
-              <a:t>Else </a:t>
-            </a:r>
-            <a:endParaRPr lang="en-US" b="1" dirty="0">
-              <a:solidFill>
-                <a:srgbClr val="00B050"/>
-              </a:solidFill>
-            </a:endParaRPr>
-          </a:p>
-        </p:txBody>
-      </p:sp>
-      <p:sp>
-        <p:nvSpPr>
-          <p:cNvPr id="5" name="TextBox 4"/>
-          <p:cNvSpPr txBox="1"/>
-          <p:nvPr/>
-        </p:nvSpPr>
-        <p:spPr>
-          <a:xfrm>
-            <a:off x="190500" y="228600"/>
-            <a:ext cx="8763000" cy="4524315"/>
-          </a:xfrm>
-          <a:prstGeom prst="rect">
-            <a:avLst/>
-          </a:prstGeom>
-          <a:noFill/>
-        </p:spPr>
-        <p:txBody>
-          <a:bodyPr wrap="square" rtlCol="0">
-            <a:spAutoFit/>
-          </a:bodyPr>
-          <a:lstStyle/>
-          <a:p>
-            <a:r>
-              <a:rPr lang="en-US" sz="2400" dirty="0">
-                <a:solidFill>
-                  <a:srgbClr val="267F99"/>
-                </a:solidFill>
-                <a:latin typeface="Menlo" panose="020B0609030804020204" pitchFamily="49" charset="0"/>
-              </a:rPr>
-              <a:t>int</a:t>
-            </a:r>
-            <a:r>
-              <a:rPr lang="en-US" sz="2400" dirty="0">
-                <a:solidFill>
-                  <a:srgbClr val="000000"/>
-                </a:solidFill>
-                <a:latin typeface="Menlo" panose="020B0609030804020204" pitchFamily="49" charset="0"/>
-              </a:rPr>
-              <a:t> </a:t>
-            </a:r>
-            <a:r>
-              <a:rPr lang="en-US" sz="2400" dirty="0">
-                <a:solidFill>
-                  <a:srgbClr val="001080"/>
-                </a:solidFill>
-                <a:latin typeface="Menlo" panose="020B0609030804020204" pitchFamily="49" charset="0"/>
-              </a:rPr>
-              <a:t>player1</a:t>
-            </a:r>
-            <a:r>
-              <a:rPr lang="en-US" sz="2400" dirty="0">
-                <a:solidFill>
-                  <a:srgbClr val="000000"/>
-                </a:solidFill>
-                <a:latin typeface="Menlo" panose="020B0609030804020204" pitchFamily="49" charset="0"/>
-              </a:rPr>
-              <a:t> = </a:t>
-            </a:r>
-            <a:r>
-              <a:rPr lang="en-US" sz="2400" dirty="0">
-                <a:solidFill>
-                  <a:srgbClr val="098658"/>
-                </a:solidFill>
-                <a:latin typeface="Menlo" panose="020B0609030804020204" pitchFamily="49" charset="0"/>
-              </a:rPr>
-              <a:t>27</a:t>
-            </a:r>
-            <a:r>
-              <a:rPr lang="en-US" sz="2400" dirty="0">
-                <a:solidFill>
-                  <a:srgbClr val="000000"/>
-                </a:solidFill>
-                <a:latin typeface="Menlo" panose="020B0609030804020204" pitchFamily="49" charset="0"/>
-              </a:rPr>
-              <a:t> ;</a:t>
-            </a:r>
-          </a:p>
-          <a:p>
-            <a:r>
-              <a:rPr lang="en-US" sz="2400" dirty="0">
-                <a:solidFill>
-                  <a:srgbClr val="AF00DB"/>
-                </a:solidFill>
-                <a:latin typeface="Menlo" panose="020B0609030804020204" pitchFamily="49" charset="0"/>
-              </a:rPr>
-              <a:t>if</a:t>
-            </a:r>
-            <a:r>
-              <a:rPr lang="en-US" sz="2400" dirty="0">
-                <a:solidFill>
-                  <a:srgbClr val="000000"/>
-                </a:solidFill>
-                <a:latin typeface="Menlo" panose="020B0609030804020204" pitchFamily="49" charset="0"/>
-              </a:rPr>
-              <a:t> (</a:t>
-            </a:r>
-            <a:r>
-              <a:rPr lang="en-US" sz="2400" dirty="0">
-                <a:solidFill>
-                  <a:srgbClr val="098658"/>
-                </a:solidFill>
-                <a:latin typeface="Menlo" panose="020B0609030804020204" pitchFamily="49" charset="0"/>
-              </a:rPr>
-              <a:t>1</a:t>
-            </a:r>
-            <a:r>
-              <a:rPr lang="en-US" sz="2400" dirty="0">
-                <a:solidFill>
-                  <a:srgbClr val="000000"/>
-                </a:solidFill>
-                <a:latin typeface="Menlo" panose="020B0609030804020204" pitchFamily="49" charset="0"/>
-              </a:rPr>
-              <a:t> &lt; player1 &amp;&amp; player1 &lt; </a:t>
-            </a:r>
-            <a:r>
-              <a:rPr lang="en-US" sz="2400" dirty="0">
-                <a:solidFill>
-                  <a:srgbClr val="098658"/>
-                </a:solidFill>
-                <a:latin typeface="Menlo" panose="020B0609030804020204" pitchFamily="49" charset="0"/>
-              </a:rPr>
-              <a:t>10</a:t>
-            </a:r>
-            <a:r>
-              <a:rPr lang="en-US" sz="2400" dirty="0">
-                <a:solidFill>
-                  <a:srgbClr val="000000"/>
-                </a:solidFill>
-                <a:latin typeface="Menlo" panose="020B0609030804020204" pitchFamily="49" charset="0"/>
-              </a:rPr>
-              <a:t>){</a:t>
-            </a:r>
-          </a:p>
-          <a:p>
-            <a:r>
-              <a:rPr lang="en-US" sz="2400" dirty="0">
-                <a:solidFill>
-                  <a:srgbClr val="795E26"/>
-                </a:solidFill>
-                <a:latin typeface="Menlo" panose="020B0609030804020204" pitchFamily="49" charset="0"/>
-              </a:rPr>
-              <a:t>say</a:t>
-            </a:r>
-            <a:r>
-              <a:rPr lang="en-US" sz="2400" dirty="0">
-                <a:solidFill>
-                  <a:srgbClr val="000000"/>
-                </a:solidFill>
-                <a:latin typeface="Menlo" panose="020B0609030804020204" pitchFamily="49" charset="0"/>
-              </a:rPr>
-              <a:t>(</a:t>
-            </a:r>
-            <a:r>
-              <a:rPr lang="en-US" sz="2400" dirty="0">
-                <a:solidFill>
-                  <a:srgbClr val="A31515"/>
-                </a:solidFill>
-                <a:latin typeface="Menlo" panose="020B0609030804020204" pitchFamily="49" charset="0"/>
-              </a:rPr>
-              <a:t>"If"</a:t>
-            </a:r>
-            <a:r>
-              <a:rPr lang="en-US" sz="2400" dirty="0">
-                <a:solidFill>
-                  <a:srgbClr val="000000"/>
-                </a:solidFill>
-                <a:latin typeface="Menlo" panose="020B0609030804020204" pitchFamily="49" charset="0"/>
-              </a:rPr>
-              <a:t>);</a:t>
-            </a:r>
-          </a:p>
-          <a:p>
-            <a:r>
-              <a:rPr lang="en-US" sz="2400" dirty="0">
-                <a:solidFill>
-                  <a:srgbClr val="000000"/>
-                </a:solidFill>
-                <a:latin typeface="Menlo" panose="020B0609030804020204" pitchFamily="49" charset="0"/>
-              </a:rPr>
-              <a:t>}</a:t>
-            </a:r>
-          </a:p>
-          <a:p>
-            <a:r>
-              <a:rPr lang="en-US" sz="2400" dirty="0">
-                <a:solidFill>
-                  <a:srgbClr val="AF00DB"/>
-                </a:solidFill>
-                <a:latin typeface="Menlo" panose="020B0609030804020204" pitchFamily="49" charset="0"/>
-              </a:rPr>
-              <a:t>else</a:t>
-            </a:r>
-            <a:r>
-              <a:rPr lang="en-US" sz="2400" dirty="0">
-                <a:solidFill>
-                  <a:srgbClr val="000000"/>
-                </a:solidFill>
-                <a:latin typeface="Menlo" panose="020B0609030804020204" pitchFamily="49" charset="0"/>
-              </a:rPr>
-              <a:t> </a:t>
-            </a:r>
-            <a:r>
-              <a:rPr lang="en-US" sz="2400" dirty="0">
-                <a:solidFill>
-                  <a:srgbClr val="AF00DB"/>
-                </a:solidFill>
-                <a:latin typeface="Menlo" panose="020B0609030804020204" pitchFamily="49" charset="0"/>
-              </a:rPr>
-              <a:t>if</a:t>
-            </a:r>
-            <a:r>
-              <a:rPr lang="en-US" sz="2400" dirty="0">
-                <a:solidFill>
-                  <a:srgbClr val="000000"/>
-                </a:solidFill>
-                <a:latin typeface="Menlo" panose="020B0609030804020204" pitchFamily="49" charset="0"/>
-              </a:rPr>
-              <a:t> (</a:t>
-            </a:r>
-            <a:r>
-              <a:rPr lang="en-US" sz="2400" dirty="0">
-                <a:solidFill>
-                  <a:srgbClr val="098658"/>
-                </a:solidFill>
-                <a:latin typeface="Menlo" panose="020B0609030804020204" pitchFamily="49" charset="0"/>
-              </a:rPr>
-              <a:t>10</a:t>
-            </a:r>
-            <a:r>
-              <a:rPr lang="en-US" sz="2400" dirty="0">
-                <a:solidFill>
-                  <a:srgbClr val="000000"/>
-                </a:solidFill>
-                <a:latin typeface="Menlo" panose="020B0609030804020204" pitchFamily="49" charset="0"/>
-              </a:rPr>
-              <a:t> &lt; player1 &amp;&amp; player1 &lt; </a:t>
-            </a:r>
-            <a:r>
-              <a:rPr lang="en-US" sz="2400" dirty="0">
-                <a:solidFill>
-                  <a:srgbClr val="098658"/>
-                </a:solidFill>
-                <a:latin typeface="Menlo" panose="020B0609030804020204" pitchFamily="49" charset="0"/>
-              </a:rPr>
-              <a:t>20</a:t>
-            </a:r>
-            <a:r>
-              <a:rPr lang="en-US" sz="2400" dirty="0">
-                <a:solidFill>
-                  <a:srgbClr val="000000"/>
-                </a:solidFill>
-                <a:latin typeface="Menlo" panose="020B0609030804020204" pitchFamily="49" charset="0"/>
-              </a:rPr>
-              <a:t>){</a:t>
-            </a:r>
-          </a:p>
-          <a:p>
-            <a:r>
-              <a:rPr lang="en-US" sz="2400" dirty="0">
-                <a:solidFill>
-                  <a:srgbClr val="795E26"/>
-                </a:solidFill>
-                <a:latin typeface="Menlo" panose="020B0609030804020204" pitchFamily="49" charset="0"/>
-              </a:rPr>
-              <a:t>say</a:t>
-            </a:r>
-            <a:r>
-              <a:rPr lang="en-US" sz="2400" dirty="0">
-                <a:solidFill>
-                  <a:srgbClr val="000000"/>
-                </a:solidFill>
-                <a:latin typeface="Menlo" panose="020B0609030804020204" pitchFamily="49" charset="0"/>
-              </a:rPr>
-              <a:t>(</a:t>
-            </a:r>
-            <a:r>
-              <a:rPr lang="en-US" sz="2400" dirty="0">
-                <a:solidFill>
-                  <a:srgbClr val="A31515"/>
-                </a:solidFill>
-                <a:latin typeface="Menlo" panose="020B0609030804020204" pitchFamily="49" charset="0"/>
-              </a:rPr>
-              <a:t>"Else If"</a:t>
-            </a:r>
-            <a:r>
-              <a:rPr lang="en-US" sz="2400" dirty="0">
-                <a:solidFill>
-                  <a:srgbClr val="000000"/>
-                </a:solidFill>
-                <a:latin typeface="Menlo" panose="020B0609030804020204" pitchFamily="49" charset="0"/>
-              </a:rPr>
-              <a:t>);</a:t>
-            </a:r>
-          </a:p>
-          <a:p>
-            <a:r>
-              <a:rPr lang="en-US" sz="2400" dirty="0">
-                <a:solidFill>
-                  <a:srgbClr val="000000"/>
-                </a:solidFill>
-                <a:latin typeface="Menlo" panose="020B0609030804020204" pitchFamily="49" charset="0"/>
-              </a:rPr>
-              <a:t>}</a:t>
-            </a:r>
-          </a:p>
-          <a:p>
-            <a:r>
-              <a:rPr lang="en-US" sz="2400" dirty="0">
-                <a:solidFill>
-                  <a:srgbClr val="AF00DB"/>
-                </a:solidFill>
-                <a:latin typeface="Menlo" panose="020B0609030804020204" pitchFamily="49" charset="0"/>
-              </a:rPr>
-              <a:t>else</a:t>
-            </a:r>
-            <a:r>
-              <a:rPr lang="en-US" sz="2400" dirty="0">
-                <a:solidFill>
-                  <a:srgbClr val="000000"/>
-                </a:solidFill>
-                <a:latin typeface="Menlo" panose="020B0609030804020204" pitchFamily="49" charset="0"/>
-              </a:rPr>
-              <a:t>{</a:t>
-            </a:r>
-          </a:p>
-          <a:p>
-            <a:r>
-              <a:rPr lang="en-US" sz="2400" dirty="0">
-                <a:solidFill>
-                  <a:srgbClr val="795E26"/>
-                </a:solidFill>
-                <a:latin typeface="Menlo" panose="020B0609030804020204" pitchFamily="49" charset="0"/>
-              </a:rPr>
-              <a:t>say</a:t>
-            </a:r>
-            <a:r>
-              <a:rPr lang="en-US" sz="2400" dirty="0">
-                <a:solidFill>
-                  <a:srgbClr val="000000"/>
-                </a:solidFill>
-                <a:latin typeface="Menlo" panose="020B0609030804020204" pitchFamily="49" charset="0"/>
-              </a:rPr>
-              <a:t>(</a:t>
-            </a:r>
-            <a:r>
-              <a:rPr lang="en-US" sz="2400" dirty="0">
-                <a:solidFill>
-                  <a:srgbClr val="A31515"/>
-                </a:solidFill>
-                <a:latin typeface="Menlo" panose="020B0609030804020204" pitchFamily="49" charset="0"/>
-              </a:rPr>
-              <a:t>"Else"</a:t>
-            </a:r>
-            <a:r>
-              <a:rPr lang="en-US" sz="2400" dirty="0">
-                <a:solidFill>
-                  <a:srgbClr val="000000"/>
-                </a:solidFill>
-                <a:latin typeface="Menlo" panose="020B0609030804020204" pitchFamily="49" charset="0"/>
-              </a:rPr>
-              <a:t>);</a:t>
-            </a:r>
-          </a:p>
-          <a:p>
-            <a:r>
-              <a:rPr lang="en-US" sz="2400" dirty="0">
-                <a:solidFill>
-                  <a:srgbClr val="000000"/>
-                </a:solidFill>
-                <a:latin typeface="Menlo" panose="020B0609030804020204" pitchFamily="49" charset="0"/>
-              </a:rPr>
-              <a:t>}</a:t>
-            </a:r>
-          </a:p>
-          <a:p>
-            <a:br>
-              <a:rPr lang="en-US" sz="2400" dirty="0">
-                <a:solidFill>
-                  <a:srgbClr val="000000"/>
-                </a:solidFill>
-                <a:latin typeface="Menlo" panose="020B0609030804020204" pitchFamily="49" charset="0"/>
-              </a:rPr>
-            </a:br>
-            <a:endParaRPr lang="en-US" sz="2400" dirty="0"/>
-          </a:p>
-        </p:txBody>
-      </p:sp>
-    </p:spTree>
-    <p:extLst>
-      <p:ext uri="{BB962C8B-B14F-4D97-AF65-F5344CB8AC3E}">
-        <p14:creationId xmlns:p14="http://schemas.microsoft.com/office/powerpoint/2010/main" val="3432061910"/>
-      </p:ext>
-    </p:extLst>
-  </p:cSld>
-  <p:clrMapOvr>
-    <a:masterClrMapping/>
-  </p:clrMapOvr>
-  <p:transition advClick="0" advTm="1000"/>
-</p:sld>
-</file>
-
-<file path=ppt/slides/slide68.xml><?xml version="1.0" encoding="utf-8"?>
-<p:sld xmlns:a="http://schemas.openxmlformats.org/drawingml/2006/main" xmlns:r="http://schemas.openxmlformats.org/officeDocument/2006/relationships" xmlns:p="http://schemas.openxmlformats.org/presentationml/2006/main">
-  <p:cSld>
-    <p:spTree>
-      <p:nvGrpSpPr>
-        <p:cNvPr id="1" name=""/>
-        <p:cNvGrpSpPr/>
-        <p:nvPr/>
-      </p:nvGrpSpPr>
-      <p:grpSpPr>
-        <a:xfrm>
-          <a:off x="0" y="0"/>
-          <a:ext cx="0" cy="0"/>
-          <a:chOff x="0" y="0"/>
-          <a:chExt cx="0" cy="0"/>
-        </a:xfrm>
-      </p:grpSpPr>
-      <p:sp>
-        <p:nvSpPr>
-          <p:cNvPr id="5" name="TextBox 4"/>
-          <p:cNvSpPr txBox="1"/>
-          <p:nvPr/>
-        </p:nvSpPr>
-        <p:spPr>
-          <a:xfrm>
-            <a:off x="190500" y="228600"/>
-            <a:ext cx="8763000" cy="4524315"/>
-          </a:xfrm>
-          <a:prstGeom prst="rect">
-            <a:avLst/>
-          </a:prstGeom>
-          <a:noFill/>
-        </p:spPr>
-        <p:txBody>
-          <a:bodyPr wrap="square" rtlCol="0">
-            <a:spAutoFit/>
-          </a:bodyPr>
-          <a:lstStyle/>
-          <a:p>
-            <a:r>
-              <a:rPr lang="en-US" sz="2400" dirty="0">
-                <a:solidFill>
-                  <a:srgbClr val="267F99"/>
-                </a:solidFill>
-                <a:latin typeface="Menlo" panose="020B0609030804020204" pitchFamily="49" charset="0"/>
-              </a:rPr>
-              <a:t>int</a:t>
-            </a:r>
-            <a:r>
-              <a:rPr lang="en-US" sz="2400" dirty="0">
-                <a:solidFill>
-                  <a:srgbClr val="000000"/>
-                </a:solidFill>
-                <a:latin typeface="Menlo" panose="020B0609030804020204" pitchFamily="49" charset="0"/>
-              </a:rPr>
-              <a:t> </a:t>
-            </a:r>
-            <a:r>
-              <a:rPr lang="en-US" sz="2400" dirty="0">
-                <a:solidFill>
-                  <a:srgbClr val="001080"/>
-                </a:solidFill>
-                <a:latin typeface="Menlo" panose="020B0609030804020204" pitchFamily="49" charset="0"/>
-              </a:rPr>
-              <a:t>player1</a:t>
-            </a:r>
-            <a:r>
-              <a:rPr lang="en-US" sz="2400" dirty="0">
-                <a:solidFill>
-                  <a:srgbClr val="000000"/>
-                </a:solidFill>
-                <a:latin typeface="Menlo" panose="020B0609030804020204" pitchFamily="49" charset="0"/>
-              </a:rPr>
-              <a:t> = </a:t>
-            </a:r>
-            <a:r>
-              <a:rPr lang="en-US" sz="2400" dirty="0">
-                <a:solidFill>
-                  <a:srgbClr val="098658"/>
-                </a:solidFill>
-                <a:latin typeface="Menlo" panose="020B0609030804020204" pitchFamily="49" charset="0"/>
-              </a:rPr>
               <a:t>-5</a:t>
             </a:r>
             <a:r>
@@ -33085,7 +32022,7 @@
 </p:sld>
 </file>
 
-<file path=ppt/slides/slide69.xml><?xml version="1.0" encoding="utf-8"?>
+<file path=ppt/slides/slide67.xml><?xml version="1.0" encoding="utf-8"?>
 <p:sld xmlns:a="http://schemas.openxmlformats.org/drawingml/2006/main" xmlns:r="http://schemas.openxmlformats.org/officeDocument/2006/relationships" xmlns:p="http://schemas.openxmlformats.org/presentationml/2006/main">
   <p:cSld>
     <p:spTree>
@@ -33946,497 +32883,6 @@
     <a:masterClrMapping/>
   </p:clrMapOvr>
   <p:transition advClick="0" advTm="1000"/>
-</p:sld>
-</file>
-
-<file path=ppt/slides/slide70.xml><?xml version="1.0" encoding="utf-8"?>
-<p:sld xmlns:a="http://schemas.openxmlformats.org/drawingml/2006/main" xmlns:r="http://schemas.openxmlformats.org/officeDocument/2006/relationships" xmlns:p="http://schemas.openxmlformats.org/presentationml/2006/main">
-  <p:cSld>
-    <p:spTree>
-      <p:nvGrpSpPr>
-        <p:cNvPr id="1" name=""/>
-        <p:cNvGrpSpPr/>
-        <p:nvPr/>
-      </p:nvGrpSpPr>
-      <p:grpSpPr>
-        <a:xfrm>
-          <a:off x="0" y="0"/>
-          <a:ext cx="0" cy="0"/>
-          <a:chOff x="0" y="0"/>
-          <a:chExt cx="0" cy="0"/>
-        </a:xfrm>
-      </p:grpSpPr>
-      <p:sp>
-        <p:nvSpPr>
-          <p:cNvPr id="5" name="TextBox 4"/>
-          <p:cNvSpPr txBox="1"/>
-          <p:nvPr/>
-        </p:nvSpPr>
-        <p:spPr>
-          <a:xfrm>
-            <a:off x="190500" y="228600"/>
-            <a:ext cx="8763000" cy="4154984"/>
-          </a:xfrm>
-          <a:prstGeom prst="rect">
-            <a:avLst/>
-          </a:prstGeom>
-          <a:noFill/>
-        </p:spPr>
-        <p:txBody>
-          <a:bodyPr wrap="square" rtlCol="0">
-            <a:spAutoFit/>
-          </a:bodyPr>
-          <a:lstStyle/>
-          <a:p>
-            <a:r>
-              <a:rPr lang="en-US" sz="2400" dirty="0">
-                <a:solidFill>
-                  <a:srgbClr val="267F99"/>
-                </a:solidFill>
-                <a:latin typeface="Menlo" panose="020B0609030804020204" pitchFamily="49" charset="0"/>
-              </a:rPr>
-              <a:t>int</a:t>
-            </a:r>
-            <a:r>
-              <a:rPr lang="en-US" sz="2400" dirty="0">
-                <a:solidFill>
-                  <a:srgbClr val="000000"/>
-                </a:solidFill>
-                <a:latin typeface="Menlo" panose="020B0609030804020204" pitchFamily="49" charset="0"/>
-              </a:rPr>
-              <a:t> </a:t>
-            </a:r>
-            <a:r>
-              <a:rPr lang="en-US" sz="2400" dirty="0">
-                <a:solidFill>
-                  <a:srgbClr val="001080"/>
-                </a:solidFill>
-                <a:latin typeface="Menlo" panose="020B0609030804020204" pitchFamily="49" charset="0"/>
-              </a:rPr>
-              <a:t>player1</a:t>
-            </a:r>
-            <a:r>
-              <a:rPr lang="en-US" sz="2400" dirty="0">
-                <a:solidFill>
-                  <a:srgbClr val="000000"/>
-                </a:solidFill>
-                <a:latin typeface="Menlo" panose="020B0609030804020204" pitchFamily="49" charset="0"/>
-              </a:rPr>
-              <a:t> = </a:t>
-            </a:r>
-            <a:r>
-              <a:rPr lang="en-US" sz="2400" dirty="0">
-                <a:solidFill>
-                  <a:srgbClr val="098658"/>
-                </a:solidFill>
-                <a:latin typeface="Menlo" panose="020B0609030804020204" pitchFamily="49" charset="0"/>
-              </a:rPr>
-              <a:t>3</a:t>
-            </a:r>
-            <a:r>
-              <a:rPr lang="en-US" sz="2400" dirty="0">
-                <a:solidFill>
-                  <a:srgbClr val="000000"/>
-                </a:solidFill>
-                <a:latin typeface="Menlo" panose="020B0609030804020204" pitchFamily="49" charset="0"/>
-              </a:rPr>
-              <a:t>;</a:t>
-            </a:r>
-          </a:p>
-          <a:p>
-            <a:r>
-              <a:rPr lang="en-US" sz="2400" dirty="0">
-                <a:solidFill>
-                  <a:srgbClr val="AF00DB"/>
-                </a:solidFill>
-                <a:latin typeface="Menlo" panose="020B0609030804020204" pitchFamily="49" charset="0"/>
-              </a:rPr>
-              <a:t>if</a:t>
-            </a:r>
-            <a:r>
-              <a:rPr lang="en-US" sz="2400" dirty="0">
-                <a:solidFill>
-                  <a:srgbClr val="000000"/>
-                </a:solidFill>
-                <a:latin typeface="Menlo" panose="020B0609030804020204" pitchFamily="49" charset="0"/>
-              </a:rPr>
-              <a:t> (player1 == </a:t>
-            </a:r>
-            <a:r>
-              <a:rPr lang="en-US" sz="2400" dirty="0">
-                <a:solidFill>
-                  <a:srgbClr val="098658"/>
-                </a:solidFill>
-                <a:latin typeface="Menlo" panose="020B0609030804020204" pitchFamily="49" charset="0"/>
-              </a:rPr>
-              <a:t>3</a:t>
-            </a:r>
-            <a:r>
-              <a:rPr lang="en-US" sz="2400" dirty="0">
-                <a:solidFill>
-                  <a:srgbClr val="000000"/>
-                </a:solidFill>
-                <a:latin typeface="Menlo" panose="020B0609030804020204" pitchFamily="49" charset="0"/>
-              </a:rPr>
-              <a:t>){</a:t>
-            </a:r>
-          </a:p>
-          <a:p>
-            <a:r>
-              <a:rPr lang="en-US" sz="2400" dirty="0">
-                <a:solidFill>
-                  <a:srgbClr val="795E26"/>
-                </a:solidFill>
-                <a:latin typeface="Menlo" panose="020B0609030804020204" pitchFamily="49" charset="0"/>
-              </a:rPr>
-              <a:t>say("</a:t>
-            </a:r>
-            <a:r>
-              <a:rPr lang="en-US" sz="2400" dirty="0">
-                <a:solidFill>
-                  <a:srgbClr val="A31515"/>
-                </a:solidFill>
-                <a:latin typeface="Menlo" panose="020B0609030804020204" pitchFamily="49" charset="0"/>
-              </a:rPr>
-              <a:t>If"</a:t>
-            </a:r>
-            <a:r>
-              <a:rPr lang="en-US" sz="2400" dirty="0">
-                <a:solidFill>
-                  <a:srgbClr val="000000"/>
-                </a:solidFill>
-                <a:latin typeface="Menlo" panose="020B0609030804020204" pitchFamily="49" charset="0"/>
-              </a:rPr>
-              <a:t>);</a:t>
-            </a:r>
-          </a:p>
-          <a:p>
-            <a:r>
-              <a:rPr lang="en-US" sz="2400" dirty="0">
-                <a:solidFill>
-                  <a:srgbClr val="000000"/>
-                </a:solidFill>
-                <a:latin typeface="Menlo" panose="020B0609030804020204" pitchFamily="49" charset="0"/>
-              </a:rPr>
-              <a:t>}</a:t>
-            </a:r>
-          </a:p>
-          <a:p>
-            <a:r>
-              <a:rPr lang="en-US" sz="2400" dirty="0">
-                <a:solidFill>
-                  <a:srgbClr val="AF00DB"/>
-                </a:solidFill>
-                <a:latin typeface="Menlo" panose="020B0609030804020204" pitchFamily="49" charset="0"/>
-              </a:rPr>
-              <a:t>else</a:t>
-            </a:r>
-            <a:r>
-              <a:rPr lang="en-US" sz="2400" dirty="0">
-                <a:solidFill>
-                  <a:srgbClr val="000000"/>
-                </a:solidFill>
-                <a:latin typeface="Menlo" panose="020B0609030804020204" pitchFamily="49" charset="0"/>
-              </a:rPr>
-              <a:t> </a:t>
-            </a:r>
-            <a:r>
-              <a:rPr lang="en-US" sz="2400" dirty="0">
-                <a:solidFill>
-                  <a:srgbClr val="AF00DB"/>
-                </a:solidFill>
-                <a:latin typeface="Menlo" panose="020B0609030804020204" pitchFamily="49" charset="0"/>
-              </a:rPr>
-              <a:t>if</a:t>
-            </a:r>
-            <a:r>
-              <a:rPr lang="en-US" sz="2400" dirty="0">
-                <a:solidFill>
-                  <a:srgbClr val="000000"/>
-                </a:solidFill>
-                <a:latin typeface="Menlo" panose="020B0609030804020204" pitchFamily="49" charset="0"/>
-              </a:rPr>
-              <a:t> (player1 == </a:t>
-            </a:r>
-            <a:r>
-              <a:rPr lang="en-US" sz="2400" dirty="0">
-                <a:solidFill>
-                  <a:srgbClr val="098658"/>
-                </a:solidFill>
-                <a:latin typeface="Menlo" panose="020B0609030804020204" pitchFamily="49" charset="0"/>
-              </a:rPr>
-              <a:t>5</a:t>
-            </a:r>
-            <a:r>
-              <a:rPr lang="en-US" sz="2400" dirty="0">
-                <a:solidFill>
-                  <a:srgbClr val="000000"/>
-                </a:solidFill>
-                <a:latin typeface="Menlo" panose="020B0609030804020204" pitchFamily="49" charset="0"/>
-              </a:rPr>
-              <a:t>){</a:t>
-            </a:r>
-          </a:p>
-          <a:p>
-            <a:r>
-              <a:rPr lang="en-US" sz="2400" dirty="0">
-                <a:solidFill>
-                  <a:srgbClr val="795E26"/>
-                </a:solidFill>
-                <a:latin typeface="Menlo" panose="020B0609030804020204" pitchFamily="49" charset="0"/>
-              </a:rPr>
-              <a:t>say("</a:t>
-            </a:r>
-            <a:r>
-              <a:rPr lang="en-US" sz="2400" dirty="0">
-                <a:solidFill>
-                  <a:srgbClr val="A31515"/>
-                </a:solidFill>
-                <a:latin typeface="Menlo" panose="020B0609030804020204" pitchFamily="49" charset="0"/>
-              </a:rPr>
-              <a:t>Else If"</a:t>
-            </a:r>
-            <a:r>
-              <a:rPr lang="en-US" sz="2400" dirty="0">
-                <a:solidFill>
-                  <a:srgbClr val="000000"/>
-                </a:solidFill>
-                <a:latin typeface="Menlo" panose="020B0609030804020204" pitchFamily="49" charset="0"/>
-              </a:rPr>
-              <a:t>);</a:t>
-            </a:r>
-          </a:p>
-          <a:p>
-            <a:r>
-              <a:rPr lang="en-US" sz="2400" dirty="0">
-                <a:solidFill>
-                  <a:srgbClr val="000000"/>
-                </a:solidFill>
-                <a:latin typeface="Menlo" panose="020B0609030804020204" pitchFamily="49" charset="0"/>
-              </a:rPr>
-              <a:t>}</a:t>
-            </a:r>
-          </a:p>
-          <a:p>
-            <a:r>
-              <a:rPr lang="en-US" sz="2400" dirty="0">
-                <a:solidFill>
-                  <a:srgbClr val="AF00DB"/>
-                </a:solidFill>
-                <a:latin typeface="Menlo" panose="020B0609030804020204" pitchFamily="49" charset="0"/>
-              </a:rPr>
-              <a:t>else</a:t>
-            </a:r>
-            <a:r>
-              <a:rPr lang="en-US" sz="2400" dirty="0">
-                <a:solidFill>
-                  <a:srgbClr val="000000"/>
-                </a:solidFill>
-                <a:latin typeface="Menlo" panose="020B0609030804020204" pitchFamily="49" charset="0"/>
-              </a:rPr>
-              <a:t>{</a:t>
-            </a:r>
-          </a:p>
-          <a:p>
-            <a:r>
-              <a:rPr lang="en-US" sz="2400" dirty="0">
-                <a:solidFill>
-                  <a:srgbClr val="795E26"/>
-                </a:solidFill>
-                <a:latin typeface="Menlo" panose="020B0609030804020204" pitchFamily="49" charset="0"/>
-              </a:rPr>
-              <a:t>say("</a:t>
-            </a:r>
-            <a:r>
-              <a:rPr lang="en-US" sz="2400" dirty="0">
-                <a:solidFill>
-                  <a:srgbClr val="A31515"/>
-                </a:solidFill>
-                <a:latin typeface="Menlo" panose="020B0609030804020204" pitchFamily="49" charset="0"/>
-              </a:rPr>
-              <a:t>Else "</a:t>
-            </a:r>
-            <a:r>
-              <a:rPr lang="en-US" sz="2400" dirty="0">
-                <a:solidFill>
-                  <a:srgbClr val="000000"/>
-                </a:solidFill>
-                <a:latin typeface="Menlo" panose="020B0609030804020204" pitchFamily="49" charset="0"/>
-              </a:rPr>
-              <a:t>);</a:t>
-            </a:r>
-          </a:p>
-          <a:p>
-            <a:r>
-              <a:rPr lang="en-US" sz="2400" dirty="0">
-                <a:solidFill>
-                  <a:srgbClr val="000000"/>
-                </a:solidFill>
-                <a:latin typeface="Menlo" panose="020B0609030804020204" pitchFamily="49" charset="0"/>
-              </a:rPr>
-              <a:t>}</a:t>
-            </a:r>
-          </a:p>
-          <a:p>
-            <a:r>
-              <a:rPr lang="da-DK" sz="2400" dirty="0">
-                <a:solidFill>
-                  <a:srgbClr val="000000"/>
-                </a:solidFill>
-                <a:latin typeface="Monaco"/>
-              </a:rPr>
-              <a:t> </a:t>
-            </a:r>
-            <a:endParaRPr lang="en-US" sz="2400" dirty="0"/>
-          </a:p>
-        </p:txBody>
-      </p:sp>
-      <p:sp>
-        <p:nvSpPr>
-          <p:cNvPr id="2" name="Rectangle 1">
-            <a:extLst>
-              <a:ext uri="{FF2B5EF4-FFF2-40B4-BE49-F238E27FC236}">
-                <a16:creationId xmlns:a16="http://schemas.microsoft.com/office/drawing/2014/main" id="{4FD6FC00-FF3A-D54F-9E80-71ADFA594ED1}"/>
-              </a:ext>
-            </a:extLst>
-          </p:cNvPr>
-          <p:cNvSpPr/>
-          <p:nvPr/>
-        </p:nvSpPr>
-        <p:spPr>
-          <a:xfrm>
-            <a:off x="3587553" y="3810000"/>
-            <a:ext cx="1418978" cy="1323439"/>
-          </a:xfrm>
-          <a:prstGeom prst="rect">
-            <a:avLst/>
-          </a:prstGeom>
-        </p:spPr>
-        <p:txBody>
-          <a:bodyPr wrap="none">
-            <a:spAutoFit/>
-          </a:bodyPr>
-          <a:lstStyle/>
-          <a:p>
-            <a:pPr algn="ctr"/>
-            <a:r>
-              <a:rPr lang="en-US" sz="8000" b="1" dirty="0">
-                <a:solidFill>
-                  <a:srgbClr val="FF2600"/>
-                </a:solidFill>
-                <a:latin typeface="Menlo" panose="020B0609030804020204" pitchFamily="49" charset="0"/>
-              </a:rPr>
-              <a:t>If</a:t>
-            </a:r>
-            <a:endParaRPr lang="en-US" b="1" dirty="0">
-              <a:solidFill>
-                <a:srgbClr val="FF2600"/>
-              </a:solidFill>
-            </a:endParaRPr>
-          </a:p>
-        </p:txBody>
-      </p:sp>
-      <p:sp>
-        <p:nvSpPr>
-          <p:cNvPr id="4" name="Rectangle 3">
-            <a:extLst>
-              <a:ext uri="{FF2B5EF4-FFF2-40B4-BE49-F238E27FC236}">
-                <a16:creationId xmlns:a16="http://schemas.microsoft.com/office/drawing/2014/main" id="{C3864E34-FDD4-C944-988F-EA845CFA951E}"/>
-              </a:ext>
-            </a:extLst>
-          </p:cNvPr>
-          <p:cNvSpPr/>
-          <p:nvPr/>
-        </p:nvSpPr>
-        <p:spPr>
-          <a:xfrm>
-            <a:off x="2044663" y="3809999"/>
-            <a:ext cx="4504759" cy="1323439"/>
-          </a:xfrm>
-          <a:prstGeom prst="rect">
-            <a:avLst/>
-          </a:prstGeom>
-        </p:spPr>
-        <p:txBody>
-          <a:bodyPr wrap="none">
-            <a:spAutoFit/>
-          </a:bodyPr>
-          <a:lstStyle/>
-          <a:p>
-            <a:pPr algn="ctr"/>
-            <a:r>
-              <a:rPr lang="en-US" sz="8000" b="1" dirty="0">
-                <a:solidFill>
-                  <a:srgbClr val="0070C0"/>
-                </a:solidFill>
-                <a:latin typeface="Menlo" panose="020B0609030804020204" pitchFamily="49" charset="0"/>
-              </a:rPr>
-              <a:t>Else If</a:t>
-            </a:r>
-            <a:endParaRPr lang="en-US" b="1" dirty="0">
-              <a:solidFill>
-                <a:srgbClr val="0070C0"/>
-              </a:solidFill>
-            </a:endParaRPr>
-          </a:p>
-        </p:txBody>
-      </p:sp>
-      <p:sp>
-        <p:nvSpPr>
-          <p:cNvPr id="6" name="Rectangle 5">
-            <a:extLst>
-              <a:ext uri="{FF2B5EF4-FFF2-40B4-BE49-F238E27FC236}">
-                <a16:creationId xmlns:a16="http://schemas.microsoft.com/office/drawing/2014/main" id="{7872D441-92A2-6F43-90CE-D5E4810DE7CA}"/>
-              </a:ext>
-            </a:extLst>
-          </p:cNvPr>
-          <p:cNvSpPr/>
-          <p:nvPr/>
-        </p:nvSpPr>
-        <p:spPr>
-          <a:xfrm>
-            <a:off x="2661819" y="3788977"/>
-            <a:ext cx="3270446" cy="1323439"/>
-          </a:xfrm>
-          <a:prstGeom prst="rect">
-            <a:avLst/>
-          </a:prstGeom>
-        </p:spPr>
-        <p:txBody>
-          <a:bodyPr wrap="none">
-            <a:spAutoFit/>
-          </a:bodyPr>
-          <a:lstStyle/>
-          <a:p>
-            <a:pPr algn="ctr"/>
-            <a:r>
-              <a:rPr lang="en-US" sz="8000" b="1" dirty="0">
-                <a:solidFill>
-                  <a:srgbClr val="00B050"/>
-                </a:solidFill>
-                <a:latin typeface="Menlo" panose="020B0609030804020204" pitchFamily="49" charset="0"/>
-              </a:rPr>
-              <a:t>Else </a:t>
-            </a:r>
-            <a:endParaRPr lang="en-US" b="1" dirty="0">
-              <a:solidFill>
-                <a:srgbClr val="00B050"/>
-              </a:solidFill>
-            </a:endParaRPr>
-          </a:p>
-        </p:txBody>
-      </p:sp>
-    </p:spTree>
-    <p:extLst>
-      <p:ext uri="{BB962C8B-B14F-4D97-AF65-F5344CB8AC3E}">
-        <p14:creationId xmlns:p14="http://schemas.microsoft.com/office/powerpoint/2010/main" val="3841951044"/>
-      </p:ext>
-    </p:extLst>
-  </p:cSld>
-  <p:clrMapOvr>
-    <a:masterClrMapping/>
-  </p:clrMapOvr>
-  <p:transition advClick="0"/>
 </p:sld>
 </file>
 

</xml_diff>